<commit_message>
defensible canonical link exp
</commit_message>
<xml_diff>
--- a/09-logistic/slides.pptx
+++ b/09-logistic/slides.pptx
@@ -6,7 +6,7 @@
     <p:sldMasterId id="2147483649" r:id="rId2"/>
   </p:sldMasterIdLst>
   <p:notesMasterIdLst>
-    <p:notesMasterId r:id="rId56"/>
+    <p:notesMasterId r:id="rId55"/>
   </p:notesMasterIdLst>
   <p:sldIdLst>
     <p:sldId id="258" r:id="rId3"/>
@@ -47,21 +47,20 @@
     <p:sldId id="694" r:id="rId38"/>
     <p:sldId id="695" r:id="rId39"/>
     <p:sldId id="720" r:id="rId40"/>
-    <p:sldId id="721" r:id="rId41"/>
-    <p:sldId id="724" r:id="rId42"/>
-    <p:sldId id="668" r:id="rId43"/>
-    <p:sldId id="699" r:id="rId44"/>
-    <p:sldId id="726" r:id="rId45"/>
-    <p:sldId id="702" r:id="rId46"/>
-    <p:sldId id="703" r:id="rId47"/>
-    <p:sldId id="706" r:id="rId48"/>
-    <p:sldId id="710" r:id="rId49"/>
-    <p:sldId id="707" r:id="rId50"/>
-    <p:sldId id="715" r:id="rId51"/>
-    <p:sldId id="711" r:id="rId52"/>
-    <p:sldId id="712" r:id="rId53"/>
-    <p:sldId id="504" r:id="rId54"/>
-    <p:sldId id="572" r:id="rId55"/>
+    <p:sldId id="724" r:id="rId41"/>
+    <p:sldId id="668" r:id="rId42"/>
+    <p:sldId id="699" r:id="rId43"/>
+    <p:sldId id="726" r:id="rId44"/>
+    <p:sldId id="702" r:id="rId45"/>
+    <p:sldId id="703" r:id="rId46"/>
+    <p:sldId id="706" r:id="rId47"/>
+    <p:sldId id="710" r:id="rId48"/>
+    <p:sldId id="707" r:id="rId49"/>
+    <p:sldId id="715" r:id="rId50"/>
+    <p:sldId id="711" r:id="rId51"/>
+    <p:sldId id="712" r:id="rId52"/>
+    <p:sldId id="504" r:id="rId53"/>
+    <p:sldId id="572" r:id="rId54"/>
   </p:sldIdLst>
   <p:sldSz cx="9363075" cy="5257800"/>
   <p:notesSz cx="6858000" cy="9144000"/>
@@ -4302,33 +4301,11 @@
           <a:bodyPr/>
           <a:lstStyle/>
           <a:p>
-            <a:pPr marL="0" marR="0" indent="0" algn="l" defTabSz="457200" rtl="0" eaLnBrk="1" fontAlgn="auto" latinLnBrk="0" hangingPunct="1">
-              <a:lnSpc>
-                <a:spcPct val="100000"/>
-              </a:lnSpc>
-              <a:spcBef>
-                <a:spcPts val="0"/>
-              </a:spcBef>
-              <a:spcAft>
-                <a:spcPts val="0"/>
-              </a:spcAft>
-              <a:buClrTx/>
-              <a:buSzTx/>
-              <a:buFontTx/>
-              <a:buNone/>
-              <a:tabLst/>
-              <a:defRPr/>
-            </a:pPr>
-            <a:r>
-              <a:rPr lang="en-US" sz="1200" baseline="0" dirty="0" smtClean="0">
-                <a:solidFill>
-                  <a:prstClr val="black"/>
-                </a:solidFill>
-                <a:latin typeface="ArialMT"/>
-                <a:sym typeface="Wingdings"/>
-              </a:rPr>
-              <a:t> </a:t>
-            </a:r>
+            <a:r>
+              <a:rPr lang="en-US" dirty="0" smtClean="0"/>
+              <a:t>  </a:t>
+            </a:r>
+            <a:endParaRPr lang="en-US" dirty="0"/>
           </a:p>
         </p:txBody>
       </p:sp>
@@ -4358,7 +4335,7 @@
     </p:spTree>
     <p:extLst>
       <p:ext uri="{BB962C8B-B14F-4D97-AF65-F5344CB8AC3E}">
-        <p14:creationId xmlns:p14="http://schemas.microsoft.com/office/powerpoint/2010/main" val="645762702"/>
+        <p14:creationId xmlns:p14="http://schemas.microsoft.com/office/powerpoint/2010/main" val="158773868"/>
       </p:ext>
     </p:extLst>
   </p:cSld>
@@ -4522,11 +4499,33 @@
           <a:bodyPr/>
           <a:lstStyle/>
           <a:p>
-            <a:r>
-              <a:rPr lang="en-US" dirty="0" smtClean="0"/>
-              <a:t>  </a:t>
-            </a:r>
-            <a:endParaRPr lang="en-US" dirty="0"/>
+            <a:pPr marL="0" marR="0" indent="0" algn="l" defTabSz="457200" rtl="0" eaLnBrk="1" fontAlgn="auto" latinLnBrk="0" hangingPunct="1">
+              <a:lnSpc>
+                <a:spcPct val="100000"/>
+              </a:lnSpc>
+              <a:spcBef>
+                <a:spcPts val="0"/>
+              </a:spcBef>
+              <a:spcAft>
+                <a:spcPts val="0"/>
+              </a:spcAft>
+              <a:buClrTx/>
+              <a:buSzTx/>
+              <a:buFontTx/>
+              <a:buNone/>
+              <a:tabLst/>
+              <a:defRPr/>
+            </a:pPr>
+            <a:r>
+              <a:rPr lang="en-US" sz="1200" baseline="0" dirty="0" smtClean="0">
+                <a:solidFill>
+                  <a:prstClr val="black"/>
+                </a:solidFill>
+                <a:latin typeface="ArialMT"/>
+                <a:sym typeface="Wingdings"/>
+              </a:rPr>
+              <a:t> </a:t>
+            </a:r>
           </a:p>
         </p:txBody>
       </p:sp>
@@ -4556,7 +4555,7 @@
     </p:spTree>
     <p:extLst>
       <p:ext uri="{BB962C8B-B14F-4D97-AF65-F5344CB8AC3E}">
-        <p14:creationId xmlns:p14="http://schemas.microsoft.com/office/powerpoint/2010/main" val="158773868"/>
+        <p14:creationId xmlns:p14="http://schemas.microsoft.com/office/powerpoint/2010/main" val="645762702"/>
       </p:ext>
     </p:extLst>
   </p:cSld>
@@ -4855,7 +4854,7 @@
                 <a:latin typeface="ArialMT"/>
                 <a:sym typeface="Wingdings"/>
               </a:rPr>
-              <a:t> </a:t>
+              <a:t>Complement: 1 – p</a:t>
             </a:r>
           </a:p>
         </p:txBody>
@@ -4965,7 +4964,7 @@
                 <a:latin typeface="ArialMT"/>
                 <a:sym typeface="Wingdings"/>
               </a:rPr>
-              <a:t>Complement: 1 – p</a:t>
+              <a:t>Note: sometimes you’ll see ‘dichotomous’ event instead of ‘binary’</a:t>
             </a:r>
           </a:p>
         </p:txBody>
@@ -5075,7 +5074,7 @@
                 <a:latin typeface="ArialMT"/>
                 <a:sym typeface="Wingdings"/>
               </a:rPr>
-              <a:t>Note: sometimes you’ll see ‘dichotomous’ event instead of ‘binary’</a:t>
+              <a:t> </a:t>
             </a:r>
           </a:p>
         </p:txBody>
@@ -5288,7 +5287,7 @@
               <a:defRPr/>
             </a:pPr>
             <a:r>
-              <a:rPr lang="en-US" sz="1200" baseline="0" dirty="0" smtClean="0">
+              <a:rPr lang="en-US" sz="1200" baseline="0" smtClean="0">
                 <a:solidFill>
                   <a:prstClr val="black"/>
                 </a:solidFill>
@@ -5297,6 +5296,13 @@
               </a:rPr>
               <a:t> </a:t>
             </a:r>
+            <a:endParaRPr lang="en-US" sz="1200" baseline="0" dirty="0" smtClean="0">
+              <a:solidFill>
+                <a:prstClr val="black"/>
+              </a:solidFill>
+              <a:latin typeface="ArialMT"/>
+              <a:sym typeface="Wingdings"/>
+            </a:endParaRPr>
           </a:p>
         </p:txBody>
       </p:sp>
@@ -5742,7 +5748,7 @@
               <a:defRPr/>
             </a:pPr>
             <a:r>
-              <a:rPr lang="en-US" sz="1200" baseline="0" smtClean="0">
+              <a:rPr lang="en-US" sz="1200" baseline="0" dirty="0" smtClean="0">
                 <a:solidFill>
                   <a:prstClr val="black"/>
                 </a:solidFill>
@@ -5751,13 +5757,6 @@
               </a:rPr>
               <a:t> </a:t>
             </a:r>
-            <a:endParaRPr lang="en-US" sz="1200" baseline="0" dirty="0" smtClean="0">
-              <a:solidFill>
-                <a:prstClr val="black"/>
-              </a:solidFill>
-              <a:latin typeface="ArialMT"/>
-              <a:sym typeface="Wingdings"/>
-            </a:endParaRPr>
           </a:p>
         </p:txBody>
       </p:sp>
@@ -5841,31 +5840,8 @@
           <a:bodyPr/>
           <a:lstStyle/>
           <a:p>
-            <a:pPr marL="0" marR="0" indent="0" algn="l" defTabSz="457200" rtl="0" eaLnBrk="1" fontAlgn="auto" latinLnBrk="0" hangingPunct="1">
-              <a:lnSpc>
-                <a:spcPct val="100000"/>
-              </a:lnSpc>
-              <a:spcBef>
-                <a:spcPts val="0"/>
-              </a:spcBef>
-              <a:spcAft>
-                <a:spcPts val="0"/>
-              </a:spcAft>
-              <a:buClrTx/>
-              <a:buSzTx/>
-              <a:buFontTx/>
-              <a:buNone/>
-              <a:tabLst/>
-              <a:defRPr/>
-            </a:pPr>
-            <a:r>
-              <a:rPr lang="en-US" sz="1200" baseline="0" dirty="0" smtClean="0">
-                <a:solidFill>
-                  <a:prstClr val="black"/>
-                </a:solidFill>
-                <a:latin typeface="ArialMT"/>
-                <a:sym typeface="Wingdings"/>
-              </a:rPr>
+            <a:r>
+              <a:rPr lang="en-US" baseline="0" dirty="0" smtClean="0"/>
               <a:t> </a:t>
             </a:r>
           </a:p>
@@ -5897,7 +5873,7 @@
     </p:spTree>
     <p:extLst>
       <p:ext uri="{BB962C8B-B14F-4D97-AF65-F5344CB8AC3E}">
-        <p14:creationId xmlns:p14="http://schemas.microsoft.com/office/powerpoint/2010/main" val="645762702"/>
+        <p14:creationId xmlns:p14="http://schemas.microsoft.com/office/powerpoint/2010/main" val="158773868"/>
       </p:ext>
     </p:extLst>
   </p:cSld>
@@ -5953,93 +5929,6 @@
           <a:p>
             <a:r>
               <a:rPr lang="en-US" baseline="0" dirty="0" smtClean="0"/>
-              <a:t> </a:t>
-            </a:r>
-          </a:p>
-        </p:txBody>
-      </p:sp>
-      <p:sp>
-        <p:nvSpPr>
-          <p:cNvPr id="4" name="Slide Number Placeholder 3"/>
-          <p:cNvSpPr>
-            <a:spLocks noGrp="1"/>
-          </p:cNvSpPr>
-          <p:nvPr>
-            <p:ph type="sldNum" sz="quarter" idx="10"/>
-          </p:nvPr>
-        </p:nvSpPr>
-        <p:spPr/>
-        <p:txBody>
-          <a:bodyPr/>
-          <a:lstStyle/>
-          <a:p>
-            <a:fld id="{ADD4B5B7-85EF-4E48-AC80-2380FACD9C23}" type="slidenum">
-              <a:rPr lang="en-US" smtClean="0"/>
-              <a:t>52</a:t>
-            </a:fld>
-            <a:endParaRPr lang="en-US"/>
-          </a:p>
-        </p:txBody>
-      </p:sp>
-    </p:spTree>
-    <p:extLst>
-      <p:ext uri="{BB962C8B-B14F-4D97-AF65-F5344CB8AC3E}">
-        <p14:creationId xmlns:p14="http://schemas.microsoft.com/office/powerpoint/2010/main" val="158773868"/>
-      </p:ext>
-    </p:extLst>
-  </p:cSld>
-  <p:clrMapOvr>
-    <a:masterClrMapping/>
-  </p:clrMapOvr>
-</p:notes>
-</file>
-
-<file path=ppt/notesSlides/notesSlide53.xml><?xml version="1.0" encoding="utf-8"?>
-<p:notes xmlns:a="http://schemas.openxmlformats.org/drawingml/2006/main" xmlns:r="http://schemas.openxmlformats.org/officeDocument/2006/relationships" xmlns:p="http://schemas.openxmlformats.org/presentationml/2006/main">
-  <p:cSld>
-    <p:spTree>
-      <p:nvGrpSpPr>
-        <p:cNvPr id="1" name=""/>
-        <p:cNvGrpSpPr/>
-        <p:nvPr/>
-      </p:nvGrpSpPr>
-      <p:grpSpPr>
-        <a:xfrm>
-          <a:off x="0" y="0"/>
-          <a:ext cx="0" cy="0"/>
-          <a:chOff x="0" y="0"/>
-          <a:chExt cx="0" cy="0"/>
-        </a:xfrm>
-      </p:grpSpPr>
-      <p:sp>
-        <p:nvSpPr>
-          <p:cNvPr id="2" name="Slide Image Placeholder 1"/>
-          <p:cNvSpPr>
-            <a:spLocks noGrp="1" noRot="1" noChangeAspect="1"/>
-          </p:cNvSpPr>
-          <p:nvPr>
-            <p:ph type="sldImg"/>
-          </p:nvPr>
-        </p:nvSpPr>
-        <p:spPr/>
-      </p:sp>
-      <p:sp>
-        <p:nvSpPr>
-          <p:cNvPr id="3" name="Notes Placeholder 2"/>
-          <p:cNvSpPr>
-            <a:spLocks noGrp="1"/>
-          </p:cNvSpPr>
-          <p:nvPr>
-            <p:ph type="body" idx="1"/>
-          </p:nvPr>
-        </p:nvSpPr>
-        <p:spPr/>
-        <p:txBody>
-          <a:bodyPr/>
-          <a:lstStyle/>
-          <a:p>
-            <a:r>
-              <a:rPr lang="en-US" baseline="0" dirty="0" smtClean="0"/>
               <a:t>Note: results only show in-sample performance!</a:t>
             </a:r>
           </a:p>
@@ -6087,7 +5976,7 @@
           <a:p>
             <a:fld id="{ADD4B5B7-85EF-4E48-AC80-2380FACD9C23}" type="slidenum">
               <a:rPr lang="en-US" smtClean="0"/>
-              <a:t>53</a:t>
+              <a:t>52</a:t>
             </a:fld>
             <a:endParaRPr lang="en-US"/>
           </a:p>
@@ -20056,7 +19945,7 @@
                 <a:latin typeface="PFDinTextCompPro-Italic"/>
                 <a:cs typeface="PFDinTextCompPro-Italic"/>
               </a:rPr>
-              <a:t>Since the Bernoulli distribution and the </a:t>
+              <a:t>The </a:t>
             </a:r>
             <a:r>
               <a:rPr lang="en-US" sz="3000" dirty="0" err="1" smtClean="0">
@@ -20070,50 +19959,89 @@
                 <a:latin typeface="PFDinTextCompPro-Italic"/>
                 <a:cs typeface="PFDinTextCompPro-Italic"/>
               </a:rPr>
-              <a:t> function share a common parameter </a:t>
-            </a:r>
-            <a:r>
-              <a:rPr lang="en-US" sz="3000" i="1" dirty="0" smtClean="0">
-                <a:latin typeface="Symbol" charset="2"/>
-                <a:cs typeface="Symbol" charset="2"/>
-              </a:rPr>
-              <a:t>p</a:t>
+              <a:t> </a:t>
             </a:r>
             <a:r>
               <a:rPr lang="en-US" sz="3000" dirty="0" smtClean="0">
                 <a:latin typeface="PFDinTextCompPro-Italic"/>
                 <a:cs typeface="PFDinTextCompPro-Italic"/>
               </a:rPr>
-              <a:t>, we say that the </a:t>
+              <a:t>is the </a:t>
+            </a:r>
+            <a:r>
+              <a:rPr lang="en-US" sz="3000" dirty="0" smtClean="0">
+                <a:latin typeface="PFDinTextCompPro-Medium"/>
+                <a:cs typeface="PFDinTextCompPro-Medium"/>
+              </a:rPr>
+              <a:t>canonical link function</a:t>
+            </a:r>
+            <a:r>
+              <a:rPr lang="en-US" sz="3000" dirty="0" smtClean="0">
+                <a:latin typeface="PFDinTextCompPro-Italic"/>
+                <a:cs typeface="PFDinTextCompPro-Italic"/>
+              </a:rPr>
+              <a:t> for the Bernoulli </a:t>
+            </a:r>
+            <a:r>
+              <a:rPr lang="en-US" sz="3000" dirty="0" smtClean="0">
+                <a:latin typeface="PFDinTextCompPro-Italic"/>
+                <a:cs typeface="PFDinTextCompPro-Italic"/>
+              </a:rPr>
+              <a:t>distribution; there are some other usable link functions (</a:t>
             </a:r>
             <a:r>
               <a:rPr lang="en-US" sz="3000" dirty="0" err="1" smtClean="0">
                 <a:latin typeface="PFDinTextCompPro-Italic"/>
                 <a:cs typeface="PFDinTextCompPro-Italic"/>
               </a:rPr>
-              <a:t>logit</a:t>
+              <a:t>probit</a:t>
             </a:r>
             <a:r>
               <a:rPr lang="en-US" sz="3000" dirty="0" smtClean="0">
                 <a:latin typeface="PFDinTextCompPro-Italic"/>
                 <a:cs typeface="PFDinTextCompPro-Italic"/>
               </a:rPr>
-              <a:t> is the </a:t>
-            </a:r>
-            <a:r>
-              <a:rPr lang="en-US" sz="3000" dirty="0" smtClean="0">
-                <a:latin typeface="PFDinTextCompPro-Medium"/>
-                <a:cs typeface="PFDinTextCompPro-Medium"/>
-              </a:rPr>
-              <a:t>canonical link function</a:t>
+              <a:t>, </a:t>
+            </a:r>
+            <a:r>
+              <a:rPr lang="en-US" sz="3000" dirty="0" err="1" smtClean="0">
+                <a:latin typeface="PFDinTextCompPro-Italic"/>
+                <a:cs typeface="PFDinTextCompPro-Italic"/>
+              </a:rPr>
+              <a:t>tobit</a:t>
             </a:r>
             <a:r>
               <a:rPr lang="en-US" sz="3000" dirty="0" smtClean="0">
                 <a:latin typeface="PFDinTextCompPro-Italic"/>
                 <a:cs typeface="PFDinTextCompPro-Italic"/>
               </a:rPr>
-              <a:t> for the Bernoulli distribution.</a:t>
-            </a:r>
+              <a:t>) but the </a:t>
+            </a:r>
+            <a:r>
+              <a:rPr lang="en-US" sz="3000" dirty="0" err="1" smtClean="0">
+                <a:latin typeface="PFDinTextCompPro-Italic"/>
+                <a:cs typeface="PFDinTextCompPro-Italic"/>
+              </a:rPr>
+              <a:t>logit</a:t>
+            </a:r>
+            <a:r>
+              <a:rPr lang="en-US" sz="3000" dirty="0" smtClean="0">
+                <a:latin typeface="PFDinTextCompPro-Italic"/>
+                <a:cs typeface="PFDinTextCompPro-Italic"/>
+              </a:rPr>
+              <a:t> simplifies things nicely and is most commonly used</a:t>
+            </a:r>
+            <a:r>
+              <a:rPr lang="en-US" sz="3000" dirty="0" smtClean="0">
+                <a:latin typeface="PFDinTextCompPro-Italic"/>
+                <a:cs typeface="PFDinTextCompPro-Italic"/>
+              </a:rPr>
+              <a:t>.</a:t>
+            </a:r>
+            <a:endParaRPr lang="en-US" sz="3000" dirty="0" smtClean="0">
+              <a:latin typeface="PFDinTextCompPro-Italic"/>
+              <a:cs typeface="PFDinTextCompPro-Italic"/>
+            </a:endParaRPr>
           </a:p>
         </p:txBody>
       </p:sp>
@@ -20181,473 +20109,87 @@
       </p:grpSpPr>
       <p:sp>
         <p:nvSpPr>
-          <p:cNvPr id="4" name="Content Placeholder 3"/>
-          <p:cNvSpPr>
-            <a:spLocks noGrp="1"/>
-          </p:cNvSpPr>
-          <p:nvPr>
-            <p:ph sz="quarter" idx="11"/>
+          <p:cNvPr id="2" name="Title 1"/>
+          <p:cNvSpPr>
+            <a:spLocks noGrp="1"/>
+          </p:cNvSpPr>
+          <p:nvPr>
+            <p:ph type="title"/>
           </p:nvPr>
         </p:nvSpPr>
         <p:spPr>
           <a:xfrm>
-            <a:off x="414337" y="495300"/>
+            <a:off x="347663" y="3238500"/>
+            <a:ext cx="8426450" cy="1828800"/>
+          </a:xfrm>
+        </p:spPr>
+        <p:txBody>
+          <a:bodyPr/>
+          <a:lstStyle/>
+          <a:p>
+            <a:pPr>
+              <a:defRPr/>
+            </a:pPr>
+            <a:r>
+              <a:rPr lang="en-US" sz="7500" dirty="0" smtClean="0"/>
+              <a:t/>
+            </a:r>
+            <a:br>
+              <a:rPr lang="en-US" sz="7500" dirty="0" smtClean="0"/>
+            </a:br>
+            <a:r>
+              <a:rPr lang="en-US" sz="7500" dirty="0" smtClean="0"/>
+              <a:t>IV. Interpreting results</a:t>
+            </a:r>
+            <a:endParaRPr lang="en-US" sz="7500" dirty="0"/>
+          </a:p>
+        </p:txBody>
+      </p:sp>
+      <p:sp>
+        <p:nvSpPr>
+          <p:cNvPr id="4" name="Content Placeholder 3"/>
+          <p:cNvSpPr>
+            <a:spLocks noGrp="1"/>
+          </p:cNvSpPr>
+          <p:nvPr>
+            <p:ph sz="quarter" idx="11"/>
+          </p:nvPr>
+        </p:nvSpPr>
+        <p:spPr>
+          <a:xfrm>
+            <a:off x="371475" y="495300"/>
             <a:ext cx="6400800" cy="304800"/>
           </a:xfrm>
         </p:spPr>
         <p:txBody>
-          <a:bodyPr/>
-          <a:lstStyle/>
-          <a:p>
-            <a:pPr eaLnBrk="1" hangingPunct="1">
-              <a:lnSpc>
-                <a:spcPts val="2448"/>
-              </a:lnSpc>
-              <a:defRPr/>
-            </a:pPr>
-            <a:r>
-              <a:rPr lang="en-US" dirty="0" smtClean="0"/>
-              <a:t>An aside: </a:t>
-            </a:r>
-            <a:r>
-              <a:rPr lang="en-US" dirty="0" err="1" smtClean="0"/>
-              <a:t>glm</a:t>
-            </a:r>
-            <a:endParaRPr lang="en-US" dirty="0"/>
-          </a:p>
-        </p:txBody>
-      </p:sp>
-      <p:sp>
-        <p:nvSpPr>
-          <p:cNvPr id="8" name="Slide Number Placeholder 3"/>
-          <p:cNvSpPr>
-            <a:spLocks noGrp="1"/>
-          </p:cNvSpPr>
-          <p:nvPr>
-            <p:ph type="sldNum" sz="quarter" idx="13"/>
-          </p:nvPr>
-        </p:nvSpPr>
-        <p:spPr/>
-        <p:txBody>
-          <a:bodyPr/>
-          <a:lstStyle/>
-          <a:p>
-            <a:pPr>
-              <a:defRPr/>
-            </a:pPr>
-            <a:fld id="{BD5AD749-DAD1-6A4A-A2AA-CB20EAD0AEB7}" type="slidenum">
-              <a:rPr lang="en-US"/>
-              <a:pPr>
-                <a:defRPr/>
-              </a:pPr>
-              <a:t>39</a:t>
-            </a:fld>
-            <a:endParaRPr lang="en-US"/>
-          </a:p>
-        </p:txBody>
-      </p:sp>
-      <p:sp>
-        <p:nvSpPr>
-          <p:cNvPr id="9" name="TextBox 8"/>
-          <p:cNvSpPr txBox="1"/>
-          <p:nvPr/>
-        </p:nvSpPr>
-        <p:spPr>
-          <a:xfrm>
-            <a:off x="566737" y="1104900"/>
-            <a:ext cx="8382000" cy="3631763"/>
-          </a:xfrm>
-          <a:prstGeom prst="rect">
-            <a:avLst/>
-          </a:prstGeom>
-          <a:noFill/>
-        </p:spPr>
-        <p:txBody>
-          <a:bodyPr wrap="square" rtlCol="0">
-            <a:spAutoFit/>
+          <a:bodyPr wrap="square" lIns="91440" tIns="45720" rIns="91440" bIns="45720" numCol="1" anchor="t" anchorCtr="0" compatLnSpc="1">
+            <a:prstTxWarp prst="textNoShape">
+              <a:avLst/>
+            </a:prstTxWarp>
           </a:bodyPr>
           <a:lstStyle/>
           <a:p>
-            <a:pPr algn="l"/>
-            <a:r>
-              <a:rPr lang="en-US" sz="3000" dirty="0" smtClean="0">
-                <a:latin typeface="PFDinTextCompPro-Italic"/>
-                <a:cs typeface="PFDinTextCompPro-Italic"/>
-              </a:rPr>
-              <a:t>In the present case, the error term follows a Bernoulli distribution, and the </a:t>
-            </a:r>
-            <a:r>
-              <a:rPr lang="en-US" sz="3000" dirty="0" err="1" smtClean="0">
-                <a:latin typeface="PFDinTextCompPro-Italic"/>
-                <a:cs typeface="PFDinTextCompPro-Italic"/>
-              </a:rPr>
-              <a:t>logit</a:t>
-            </a:r>
-            <a:r>
-              <a:rPr lang="en-US" sz="3000" dirty="0" smtClean="0">
-                <a:latin typeface="PFDinTextCompPro-Italic"/>
-                <a:cs typeface="PFDinTextCompPro-Italic"/>
-              </a:rPr>
-              <a:t> is the link function that connects us to the linear predictor.</a:t>
-            </a:r>
-          </a:p>
-          <a:p>
-            <a:pPr algn="l"/>
-            <a:endParaRPr lang="en-US" sz="2000" dirty="0">
-              <a:latin typeface="PFDinTextCompPro-Italic"/>
-              <a:cs typeface="PFDinTextCompPro-Italic"/>
+            <a:pPr marL="0" indent="0"/>
+            <a:r>
+              <a:rPr lang="en-US" cap="none" dirty="0" smtClean="0">
+                <a:latin typeface="PFDinTextCompPro-Bold" charset="0"/>
+                <a:ea typeface="ヒラギノ角ゴ ProN W3" charset="0"/>
+                <a:cs typeface="ヒラギノ角ゴ ProN W3" charset="0"/>
+              </a:rPr>
+              <a:t>INTRO TO DATA SCIENCE</a:t>
+            </a:r>
+            <a:endParaRPr lang="en-US" cap="none" dirty="0">
+              <a:latin typeface="PFDinTextCompPro-Bold" charset="0"/>
+              <a:ea typeface="ヒラギノ角ゴ ProN W3" charset="0"/>
+              <a:cs typeface="ヒラギノ角ゴ ProN W3" charset="0"/>
             </a:endParaRPr>
           </a:p>
-          <a:p>
-            <a:pPr algn="l"/>
-            <a:endParaRPr lang="en-US" sz="3000" dirty="0" smtClean="0">
-              <a:latin typeface="PFDinTextCompPro-Italic"/>
-              <a:cs typeface="PFDinTextCompPro-Italic"/>
-            </a:endParaRPr>
-          </a:p>
-          <a:p>
-            <a:pPr algn="l"/>
-            <a:endParaRPr lang="en-US" sz="3000" dirty="0" smtClean="0">
-              <a:latin typeface="PFDinTextCompPro-Italic"/>
-              <a:cs typeface="PFDinTextCompPro-Italic"/>
-            </a:endParaRPr>
-          </a:p>
-          <a:p>
-            <a:pPr algn="l"/>
-            <a:r>
-              <a:rPr lang="en-US" sz="3000" dirty="0" smtClean="0">
-                <a:latin typeface="PFDinTextCompPro-Italic"/>
-                <a:cs typeface="PFDinTextCompPro-Italic"/>
-              </a:rPr>
-              <a:t>Since the Bernoulli distribution and the </a:t>
-            </a:r>
-            <a:r>
-              <a:rPr lang="en-US" sz="3000" dirty="0" err="1" smtClean="0">
-                <a:latin typeface="PFDinTextCompPro-Italic"/>
-                <a:cs typeface="PFDinTextCompPro-Italic"/>
-              </a:rPr>
-              <a:t>logit</a:t>
-            </a:r>
-            <a:r>
-              <a:rPr lang="en-US" sz="3000" dirty="0" smtClean="0">
-                <a:latin typeface="PFDinTextCompPro-Italic"/>
-                <a:cs typeface="PFDinTextCompPro-Italic"/>
-              </a:rPr>
-              <a:t> function share a common parameter </a:t>
-            </a:r>
-            <a:r>
-              <a:rPr lang="en-US" sz="3000" i="1" dirty="0" smtClean="0">
-                <a:latin typeface="Symbol" charset="2"/>
-                <a:cs typeface="Symbol" charset="2"/>
-              </a:rPr>
-              <a:t>p</a:t>
-            </a:r>
-            <a:r>
-              <a:rPr lang="en-US" sz="3000" dirty="0" smtClean="0">
-                <a:latin typeface="PFDinTextCompPro-Italic"/>
-                <a:cs typeface="PFDinTextCompPro-Italic"/>
-              </a:rPr>
-              <a:t>, we say that the </a:t>
-            </a:r>
-            <a:r>
-              <a:rPr lang="en-US" sz="3000" dirty="0" err="1" smtClean="0">
-                <a:latin typeface="PFDinTextCompPro-Italic"/>
-                <a:cs typeface="PFDinTextCompPro-Italic"/>
-              </a:rPr>
-              <a:t>logit</a:t>
-            </a:r>
-            <a:r>
-              <a:rPr lang="en-US" sz="3000" dirty="0" smtClean="0">
-                <a:latin typeface="PFDinTextCompPro-Italic"/>
-                <a:cs typeface="PFDinTextCompPro-Italic"/>
-              </a:rPr>
-              <a:t> is the </a:t>
-            </a:r>
-            <a:r>
-              <a:rPr lang="en-US" sz="3000" dirty="0" smtClean="0">
-                <a:latin typeface="PFDinTextCompPro-Medium"/>
-                <a:cs typeface="PFDinTextCompPro-Medium"/>
-              </a:rPr>
-              <a:t>canonical link function</a:t>
-            </a:r>
-            <a:r>
-              <a:rPr lang="en-US" sz="3000" dirty="0" smtClean="0">
-                <a:latin typeface="PFDinTextCompPro-Italic"/>
-                <a:cs typeface="PFDinTextCompPro-Italic"/>
-              </a:rPr>
-              <a:t> for the Bernoulli distribution.</a:t>
-            </a:r>
-          </a:p>
-        </p:txBody>
-      </p:sp>
-      <p:pic>
-        <p:nvPicPr>
-          <p:cNvPr id="5" name="Picture 4"/>
-          <p:cNvPicPr>
-            <a:picLocks noChangeAspect="1"/>
-          </p:cNvPicPr>
-          <p:nvPr/>
-        </p:nvPicPr>
-        <p:blipFill>
-          <a:blip r:embed="rId3"/>
-          <a:stretch>
-            <a:fillRect/>
-          </a:stretch>
-        </p:blipFill>
-        <p:spPr>
-          <a:xfrm>
-            <a:off x="2146300" y="2336800"/>
-            <a:ext cx="5067300" cy="673100"/>
-          </a:xfrm>
-          <a:prstGeom prst="rect">
-            <a:avLst/>
-          </a:prstGeom>
-        </p:spPr>
-      </p:pic>
-      <p:grpSp>
-        <p:nvGrpSpPr>
-          <p:cNvPr id="6" name="Group 26"/>
-          <p:cNvGrpSpPr>
-            <a:grpSpLocks/>
-          </p:cNvGrpSpPr>
-          <p:nvPr/>
-        </p:nvGrpSpPr>
-        <p:grpSpPr bwMode="auto">
-          <a:xfrm>
-            <a:off x="7256462" y="1317625"/>
-            <a:ext cx="1463675" cy="1463675"/>
-            <a:chOff x="0" y="14"/>
-            <a:chExt cx="1280" cy="1280"/>
-          </a:xfrm>
-        </p:grpSpPr>
-        <p:pic>
-          <p:nvPicPr>
-            <p:cNvPr id="7" name="Picture 23"/>
-            <p:cNvPicPr>
-              <a:picLocks noChangeAspect="1" noChangeArrowheads="1"/>
-            </p:cNvPicPr>
-            <p:nvPr/>
-          </p:nvPicPr>
-          <p:blipFill>
-            <a:blip r:embed="rId4">
-              <a:extLst>
-                <a:ext uri="{28A0092B-C50C-407E-A947-70E740481C1C}">
-                  <a14:useLocalDpi xmlns:a14="http://schemas.microsoft.com/office/drawing/2010/main" val="0"/>
-                </a:ext>
-              </a:extLst>
-            </a:blip>
-            <a:srcRect/>
-            <a:stretch>
-              <a:fillRect/>
-            </a:stretch>
-          </p:blipFill>
-          <p:spPr bwMode="auto">
-            <a:xfrm>
-              <a:off x="0" y="14"/>
-              <a:ext cx="1280" cy="1280"/>
-            </a:xfrm>
-            <a:prstGeom prst="rect">
-              <a:avLst/>
-            </a:prstGeom>
-            <a:noFill/>
-            <a:ln>
-              <a:noFill/>
-            </a:ln>
-            <a:extLst>
-              <a:ext uri="{909E8E84-426E-40dd-AFC4-6F175D3DCCD1}">
-                <a14:hiddenFill xmlns:a14="http://schemas.microsoft.com/office/drawing/2010/main">
-                  <a:solidFill>
-                    <a:srgbClr val="FFFFFF"/>
-                  </a:solidFill>
-                </a14:hiddenFill>
-              </a:ext>
-              <a:ext uri="{91240B29-F687-4f45-9708-019B960494DF}">
-                <a14:hiddenLine xmlns:a14="http://schemas.microsoft.com/office/drawing/2010/main" w="12700">
-                  <a:solidFill>
-                    <a:schemeClr val="tx1"/>
-                  </a:solidFill>
-                  <a:miter lim="800000"/>
-                  <a:headEnd/>
-                  <a:tailEnd/>
-                </a14:hiddenLine>
-              </a:ext>
-            </a:extLst>
-          </p:spPr>
-        </p:pic>
-        <p:sp>
-          <p:nvSpPr>
-            <p:cNvPr id="10" name="Rectangle 24"/>
-            <p:cNvSpPr>
-              <a:spLocks/>
-            </p:cNvSpPr>
-            <p:nvPr/>
-          </p:nvSpPr>
-          <p:spPr bwMode="auto">
-            <a:xfrm>
-              <a:off x="104" y="96"/>
-              <a:ext cx="1056" cy="152"/>
-            </a:xfrm>
-            <a:prstGeom prst="rect">
-              <a:avLst/>
-            </a:prstGeom>
-            <a:noFill/>
-            <a:ln>
-              <a:noFill/>
-            </a:ln>
-            <a:extLst>
-              <a:ext uri="{909E8E84-426E-40dd-AFC4-6F175D3DCCD1}">
-                <a14:hiddenFill xmlns:a14="http://schemas.microsoft.com/office/drawing/2010/main">
-                  <a:solidFill>
-                    <a:srgbClr val="FFFFFF"/>
-                  </a:solidFill>
-                </a14:hiddenFill>
-              </a:ext>
-              <a:ext uri="{91240B29-F687-4f45-9708-019B960494DF}">
-                <a14:hiddenLine xmlns:a14="http://schemas.microsoft.com/office/drawing/2010/main" w="12700">
-                  <a:solidFill>
-                    <a:schemeClr val="tx1"/>
-                  </a:solidFill>
-                  <a:miter lim="800000"/>
-                  <a:headEnd/>
-                  <a:tailEnd/>
-                </a14:hiddenLine>
-              </a:ext>
-            </a:extLst>
-          </p:spPr>
-          <p:txBody>
-            <a:bodyPr lIns="0" tIns="0" rIns="0" bIns="0"/>
-            <a:lstStyle/>
-            <a:p>
-              <a:pPr algn="l">
-                <a:lnSpc>
-                  <a:spcPct val="75000"/>
-                </a:lnSpc>
-              </a:pPr>
-              <a:r>
-                <a:rPr lang="en-US" sz="1300" dirty="0" smtClean="0">
-                  <a:solidFill>
-                    <a:schemeClr val="tx1"/>
-                  </a:solidFill>
-                  <a:latin typeface="PFDinTextCompPro-Bold" charset="0"/>
-                  <a:ea typeface="ＭＳ Ｐゴシック" charset="0"/>
-                  <a:cs typeface="ＭＳ Ｐゴシック" charset="0"/>
-                  <a:sym typeface="PFDinTextCompPro-Bold" charset="0"/>
-                </a:rPr>
-                <a:t>NOTE</a:t>
-              </a:r>
-              <a:endParaRPr lang="en-US" sz="1300" dirty="0">
-                <a:solidFill>
-                  <a:schemeClr val="tx1"/>
-                </a:solidFill>
-                <a:latin typeface="PFDinTextCompPro-Bold" charset="0"/>
-                <a:ea typeface="ＭＳ Ｐゴシック" charset="0"/>
-                <a:cs typeface="ＭＳ Ｐゴシック" charset="0"/>
-                <a:sym typeface="PFDinTextCompPro-Bold" charset="0"/>
-              </a:endParaRPr>
-            </a:p>
-          </p:txBody>
-        </p:sp>
-        <p:sp>
-          <p:nvSpPr>
-            <p:cNvPr id="11" name="Rectangle 25"/>
-            <p:cNvSpPr>
-              <a:spLocks/>
-            </p:cNvSpPr>
-            <p:nvPr/>
-          </p:nvSpPr>
-          <p:spPr bwMode="auto">
-            <a:xfrm>
-              <a:off x="104" y="264"/>
-              <a:ext cx="1056" cy="896"/>
-            </a:xfrm>
-            <a:prstGeom prst="rect">
-              <a:avLst/>
-            </a:prstGeom>
-            <a:noFill/>
-            <a:ln>
-              <a:noFill/>
-            </a:ln>
-            <a:extLst>
-              <a:ext uri="{909E8E84-426E-40dd-AFC4-6F175D3DCCD1}">
-                <a14:hiddenFill xmlns:a14="http://schemas.microsoft.com/office/drawing/2010/main">
-                  <a:solidFill>
-                    <a:srgbClr val="FFFFFF"/>
-                  </a:solidFill>
-                </a14:hiddenFill>
-              </a:ext>
-              <a:ext uri="{91240B29-F687-4f45-9708-019B960494DF}">
-                <a14:hiddenLine xmlns:a14="http://schemas.microsoft.com/office/drawing/2010/main" w="12700">
-                  <a:solidFill>
-                    <a:schemeClr val="tx1"/>
-                  </a:solidFill>
-                  <a:miter lim="800000"/>
-                  <a:headEnd/>
-                  <a:tailEnd/>
-                </a14:hiddenLine>
-              </a:ext>
-            </a:extLst>
-          </p:spPr>
-          <p:txBody>
-            <a:bodyPr lIns="0" tIns="0" rIns="0" bIns="0"/>
-            <a:lstStyle/>
-            <a:p>
-              <a:pPr algn="l">
-                <a:lnSpc>
-                  <a:spcPts val="1150"/>
-                </a:lnSpc>
-              </a:pPr>
-              <a:endParaRPr lang="en-US" sz="900" dirty="0" smtClean="0">
-                <a:solidFill>
-                  <a:schemeClr val="tx1"/>
-                </a:solidFill>
-                <a:latin typeface="+mn-lt"/>
-                <a:ea typeface="ＭＳ Ｐゴシック" charset="0"/>
-                <a:cs typeface="PFDinTextCompPro-Italic"/>
-                <a:sym typeface="News706 BT" charset="0"/>
-              </a:endParaRPr>
-            </a:p>
-            <a:p>
-              <a:pPr algn="l">
-                <a:lnSpc>
-                  <a:spcPts val="1150"/>
-                </a:lnSpc>
-              </a:pPr>
-              <a:endParaRPr lang="en-US" sz="900" dirty="0" smtClean="0">
-                <a:solidFill>
-                  <a:schemeClr val="tx1"/>
-                </a:solidFill>
-                <a:latin typeface="+mn-lt"/>
-                <a:ea typeface="ＭＳ Ｐゴシック" charset="0"/>
-                <a:cs typeface="PFDinTextCompPro-Italic"/>
-                <a:sym typeface="News706 BT" charset="0"/>
-              </a:endParaRPr>
-            </a:p>
-            <a:p>
-              <a:pPr algn="l">
-                <a:lnSpc>
-                  <a:spcPts val="1150"/>
-                </a:lnSpc>
-              </a:pPr>
-              <a:r>
-                <a:rPr lang="en-US" sz="900" dirty="0" smtClean="0">
-                  <a:solidFill>
-                    <a:schemeClr val="tx1"/>
-                  </a:solidFill>
-                  <a:latin typeface="+mn-lt"/>
-                  <a:ea typeface="ＭＳ Ｐゴシック" charset="0"/>
-                  <a:cs typeface="PFDinTextCompPro-Italic"/>
-                  <a:sym typeface="News706 BT" charset="0"/>
-                </a:rPr>
-                <a:t>This terminology is just FYI!</a:t>
-              </a:r>
-            </a:p>
-          </p:txBody>
-        </p:sp>
-      </p:grpSp>
+        </p:txBody>
+      </p:sp>
     </p:spTree>
     <p:extLst>
       <p:ext uri="{BB962C8B-B14F-4D97-AF65-F5344CB8AC3E}">
-        <p14:creationId xmlns:p14="http://schemas.microsoft.com/office/powerpoint/2010/main" val="1822823041"/>
+        <p14:creationId xmlns:p14="http://schemas.microsoft.com/office/powerpoint/2010/main" val="3656152759"/>
       </p:ext>
     </p:extLst>
   </p:cSld>
@@ -21001,20 +20543,49 @@
       </p:grpSpPr>
       <p:sp>
         <p:nvSpPr>
-          <p:cNvPr id="2" name="Title 1"/>
-          <p:cNvSpPr>
-            <a:spLocks noGrp="1"/>
-          </p:cNvSpPr>
-          <p:nvPr>
-            <p:ph type="title"/>
+          <p:cNvPr id="4" name="Content Placeholder 3"/>
+          <p:cNvSpPr>
+            <a:spLocks noGrp="1"/>
+          </p:cNvSpPr>
+          <p:nvPr>
+            <p:ph sz="quarter" idx="11"/>
           </p:nvPr>
         </p:nvSpPr>
         <p:spPr>
           <a:xfrm>
-            <a:off x="347663" y="3238500"/>
-            <a:ext cx="8426450" cy="1828800"/>
+            <a:off x="414337" y="495300"/>
+            <a:ext cx="6400800" cy="304800"/>
           </a:xfrm>
         </p:spPr>
+        <p:txBody>
+          <a:bodyPr/>
+          <a:lstStyle/>
+          <a:p>
+            <a:pPr eaLnBrk="1" hangingPunct="1">
+              <a:lnSpc>
+                <a:spcPts val="2448"/>
+              </a:lnSpc>
+              <a:defRPr/>
+            </a:pPr>
+            <a:r>
+              <a:rPr lang="en-US" dirty="0" smtClean="0"/>
+              <a:t>Interpreting results</a:t>
+            </a:r>
+            <a:endParaRPr lang="en-US" dirty="0"/>
+          </a:p>
+        </p:txBody>
+      </p:sp>
+      <p:sp>
+        <p:nvSpPr>
+          <p:cNvPr id="8" name="Slide Number Placeholder 3"/>
+          <p:cNvSpPr>
+            <a:spLocks noGrp="1"/>
+          </p:cNvSpPr>
+          <p:nvPr>
+            <p:ph type="sldNum" sz="quarter" idx="13"/>
+          </p:nvPr>
+        </p:nvSpPr>
+        <p:spPr/>
         <p:txBody>
           <a:bodyPr/>
           <a:lstStyle/>
@@ -21022,66 +20593,68 @@
             <a:pPr>
               <a:defRPr/>
             </a:pPr>
-            <a:r>
-              <a:rPr lang="en-US" sz="7500" dirty="0" smtClean="0"/>
-              <a:t/>
-            </a:r>
-            <a:br>
-              <a:rPr lang="en-US" sz="7500" dirty="0" smtClean="0"/>
-            </a:br>
-            <a:r>
-              <a:rPr lang="en-US" sz="7500" dirty="0" smtClean="0"/>
-              <a:t>IV. Interpreting results</a:t>
-            </a:r>
-            <a:endParaRPr lang="en-US" sz="7500" dirty="0"/>
-          </a:p>
-        </p:txBody>
-      </p:sp>
-      <p:sp>
-        <p:nvSpPr>
-          <p:cNvPr id="4" name="Content Placeholder 3"/>
-          <p:cNvSpPr>
-            <a:spLocks noGrp="1"/>
-          </p:cNvSpPr>
-          <p:nvPr>
-            <p:ph sz="quarter" idx="11"/>
-          </p:nvPr>
+            <a:fld id="{BD5AD749-DAD1-6A4A-A2AA-CB20EAD0AEB7}" type="slidenum">
+              <a:rPr lang="en-US"/>
+              <a:pPr>
+                <a:defRPr/>
+              </a:pPr>
+              <a:t>40</a:t>
+            </a:fld>
+            <a:endParaRPr lang="en-US"/>
+          </a:p>
+        </p:txBody>
+      </p:sp>
+      <p:sp>
+        <p:nvSpPr>
+          <p:cNvPr id="9" name="TextBox 8"/>
+          <p:cNvSpPr txBox="1"/>
+          <p:nvPr/>
         </p:nvSpPr>
         <p:spPr>
           <a:xfrm>
-            <a:off x="371475" y="495300"/>
-            <a:ext cx="6400800" cy="304800"/>
+            <a:off x="566737" y="1104900"/>
+            <a:ext cx="8382000" cy="1015663"/>
           </a:xfrm>
+          <a:prstGeom prst="rect">
+            <a:avLst/>
+          </a:prstGeom>
+          <a:noFill/>
         </p:spPr>
         <p:txBody>
-          <a:bodyPr wrap="square" lIns="91440" tIns="45720" rIns="91440" bIns="45720" numCol="1" anchor="t" anchorCtr="0" compatLnSpc="1">
-            <a:prstTxWarp prst="textNoShape">
-              <a:avLst/>
-            </a:prstTxWarp>
+          <a:bodyPr wrap="square" rtlCol="0">
+            <a:spAutoFit/>
           </a:bodyPr>
           <a:lstStyle/>
           <a:p>
-            <a:pPr marL="0" indent="0"/>
-            <a:r>
-              <a:rPr lang="en-US" cap="none" dirty="0" smtClean="0">
-                <a:latin typeface="PFDinTextCompPro-Bold" charset="0"/>
-                <a:ea typeface="ヒラギノ角ゴ ProN W3" charset="0"/>
-                <a:cs typeface="ヒラギノ角ゴ ProN W3" charset="0"/>
-              </a:rPr>
-              <a:t>INTRO TO DATA SCIENCE</a:t>
-            </a:r>
-            <a:endParaRPr lang="en-US" cap="none" dirty="0">
-              <a:latin typeface="PFDinTextCompPro-Bold" charset="0"/>
-              <a:ea typeface="ヒラギノ角ゴ ProN W3" charset="0"/>
-              <a:cs typeface="ヒラギノ角ゴ ProN W3" charset="0"/>
-            </a:endParaRPr>
+            <a:pPr algn="l"/>
+            <a:r>
+              <a:rPr lang="en-US" sz="3000" dirty="0" smtClean="0">
+                <a:latin typeface="PFDinTextCompPro-Italic"/>
+                <a:cs typeface="PFDinTextCompPro-Italic"/>
+              </a:rPr>
+              <a:t>In linear regression, the parameter </a:t>
+            </a:r>
+            <a:r>
+              <a:rPr lang="en-US" sz="3000" i="1" dirty="0" smtClean="0">
+                <a:latin typeface="Symbol" charset="2"/>
+                <a:cs typeface="Symbol" charset="2"/>
+              </a:rPr>
+              <a:t>b</a:t>
+            </a:r>
+            <a:r>
+              <a:rPr lang="en-US" sz="3000" dirty="0" smtClean="0">
+                <a:latin typeface="PFDinTextCompPro-Italic"/>
+                <a:cs typeface="PFDinTextCompPro-Italic"/>
+              </a:rPr>
+              <a:t> represents the change in the response variable for a unit change in the covariate.</a:t>
+            </a:r>
           </a:p>
         </p:txBody>
       </p:sp>
     </p:spTree>
     <p:extLst>
       <p:ext uri="{BB962C8B-B14F-4D97-AF65-F5344CB8AC3E}">
-        <p14:creationId xmlns:p14="http://schemas.microsoft.com/office/powerpoint/2010/main" val="3656152759"/>
+        <p14:creationId xmlns:p14="http://schemas.microsoft.com/office/powerpoint/2010/main" val="1407424654"/>
       </p:ext>
     </p:extLst>
   </p:cSld>
@@ -21188,7 +20761,7 @@
         <p:spPr>
           <a:xfrm>
             <a:off x="566737" y="1104900"/>
-            <a:ext cx="8382000" cy="1015663"/>
+            <a:ext cx="8382000" cy="2400657"/>
           </a:xfrm>
           <a:prstGeom prst="rect">
             <a:avLst/>
@@ -21224,12 +20797,57 @@
               <a:t> represents the change in the response variable for a unit change in the covariate.</a:t>
             </a:r>
           </a:p>
+          <a:p>
+            <a:pPr algn="l"/>
+            <a:endParaRPr lang="en-US" sz="3000" dirty="0">
+              <a:latin typeface="PFDinTextCompPro-Italic"/>
+              <a:cs typeface="PFDinTextCompPro-Italic"/>
+            </a:endParaRPr>
+          </a:p>
+          <a:p>
+            <a:pPr algn="l"/>
+            <a:r>
+              <a:rPr lang="en-US" sz="3000" dirty="0" smtClean="0">
+                <a:latin typeface="PFDinTextCompPro-Italic"/>
+                <a:cs typeface="PFDinTextCompPro-Italic"/>
+              </a:rPr>
+              <a:t>In logistic regression, </a:t>
+            </a:r>
+            <a:r>
+              <a:rPr lang="en-US" sz="3000" i="1" dirty="0" smtClean="0">
+                <a:latin typeface="Symbol" charset="2"/>
+                <a:cs typeface="Symbol" charset="2"/>
+              </a:rPr>
+              <a:t>b</a:t>
+            </a:r>
+            <a:r>
+              <a:rPr lang="en-US" sz="3000" dirty="0" smtClean="0">
+                <a:latin typeface="PFDinTextCompPro-Italic"/>
+                <a:cs typeface="PFDinTextCompPro-Italic"/>
+              </a:rPr>
+              <a:t> represents the change in the </a:t>
+            </a:r>
+            <a:r>
+              <a:rPr lang="en-US" sz="3000" dirty="0" err="1" smtClean="0">
+                <a:latin typeface="PFDinTextCompPro-Italic"/>
+                <a:cs typeface="PFDinTextCompPro-Italic"/>
+              </a:rPr>
+              <a:t>logit</a:t>
+            </a:r>
+            <a:r>
+              <a:rPr lang="en-US" sz="3000" dirty="0" smtClean="0">
+                <a:latin typeface="PFDinTextCompPro-Italic"/>
+                <a:cs typeface="PFDinTextCompPro-Italic"/>
+              </a:rPr>
+              <a:t> function for a unit change in the covariate.</a:t>
+            </a:r>
+          </a:p>
         </p:txBody>
       </p:sp>
     </p:spTree>
     <p:extLst>
       <p:ext uri="{BB962C8B-B14F-4D97-AF65-F5344CB8AC3E}">
-        <p14:creationId xmlns:p14="http://schemas.microsoft.com/office/powerpoint/2010/main" val="1407424654"/>
+        <p14:creationId xmlns:p14="http://schemas.microsoft.com/office/powerpoint/2010/main" val="4013486810"/>
       </p:ext>
     </p:extLst>
   </p:cSld>
@@ -21336,7 +20954,7 @@
         <p:spPr>
           <a:xfrm>
             <a:off x="566737" y="1104900"/>
-            <a:ext cx="8382000" cy="2400657"/>
+            <a:ext cx="8382000" cy="3785652"/>
           </a:xfrm>
           <a:prstGeom prst="rect">
             <a:avLst/>
@@ -21417,12 +21035,43 @@
               <a:t> function for a unit change in the covariate.</a:t>
             </a:r>
           </a:p>
+          <a:p>
+            <a:pPr algn="l"/>
+            <a:endParaRPr lang="en-US" sz="3000" dirty="0">
+              <a:latin typeface="PFDinTextCompPro-Italic"/>
+              <a:cs typeface="PFDinTextCompPro-Italic"/>
+            </a:endParaRPr>
+          </a:p>
+          <a:p>
+            <a:pPr algn="l"/>
+            <a:r>
+              <a:rPr lang="en-US" sz="3000" dirty="0" smtClean="0">
+                <a:latin typeface="PFDinTextCompPro-Italic"/>
+                <a:cs typeface="PFDinTextCompPro-Italic"/>
+              </a:rPr>
+              <a:t>Interpreting this change in the </a:t>
+            </a:r>
+            <a:r>
+              <a:rPr lang="en-US" sz="3000" dirty="0" err="1" smtClean="0">
+                <a:latin typeface="PFDinTextCompPro-Italic"/>
+                <a:cs typeface="PFDinTextCompPro-Italic"/>
+              </a:rPr>
+              <a:t>logit</a:t>
+            </a:r>
+            <a:r>
+              <a:rPr lang="en-US" sz="3000" dirty="0" smtClean="0">
+                <a:latin typeface="PFDinTextCompPro-Italic"/>
+                <a:cs typeface="PFDinTextCompPro-Italic"/>
+              </a:rPr>
+              <a:t> function requires another definition first.</a:t>
+            </a:r>
+          </a:p>
         </p:txBody>
       </p:sp>
     </p:spTree>
     <p:extLst>
       <p:ext uri="{BB962C8B-B14F-4D97-AF65-F5344CB8AC3E}">
-        <p14:creationId xmlns:p14="http://schemas.microsoft.com/office/powerpoint/2010/main" val="4013486810"/>
+        <p14:creationId xmlns:p14="http://schemas.microsoft.com/office/powerpoint/2010/main" val="874680083"/>
       </p:ext>
     </p:extLst>
   </p:cSld>
@@ -21515,230 +21164,6 @@
                 <a:defRPr/>
               </a:pPr>
               <a:t>43</a:t>
-            </a:fld>
-            <a:endParaRPr lang="en-US"/>
-          </a:p>
-        </p:txBody>
-      </p:sp>
-      <p:sp>
-        <p:nvSpPr>
-          <p:cNvPr id="9" name="TextBox 8"/>
-          <p:cNvSpPr txBox="1"/>
-          <p:nvPr/>
-        </p:nvSpPr>
-        <p:spPr>
-          <a:xfrm>
-            <a:off x="566737" y="1104900"/>
-            <a:ext cx="8382000" cy="3785652"/>
-          </a:xfrm>
-          <a:prstGeom prst="rect">
-            <a:avLst/>
-          </a:prstGeom>
-          <a:noFill/>
-        </p:spPr>
-        <p:txBody>
-          <a:bodyPr wrap="square" rtlCol="0">
-            <a:spAutoFit/>
-          </a:bodyPr>
-          <a:lstStyle/>
-          <a:p>
-            <a:pPr algn="l"/>
-            <a:r>
-              <a:rPr lang="en-US" sz="3000" dirty="0" smtClean="0">
-                <a:latin typeface="PFDinTextCompPro-Italic"/>
-                <a:cs typeface="PFDinTextCompPro-Italic"/>
-              </a:rPr>
-              <a:t>In linear regression, the parameter </a:t>
-            </a:r>
-            <a:r>
-              <a:rPr lang="en-US" sz="3000" i="1" dirty="0" smtClean="0">
-                <a:latin typeface="Symbol" charset="2"/>
-                <a:cs typeface="Symbol" charset="2"/>
-              </a:rPr>
-              <a:t>b</a:t>
-            </a:r>
-            <a:r>
-              <a:rPr lang="en-US" sz="3000" dirty="0" smtClean="0">
-                <a:latin typeface="PFDinTextCompPro-Italic"/>
-                <a:cs typeface="PFDinTextCompPro-Italic"/>
-              </a:rPr>
-              <a:t> represents the change in the response variable for a unit change in the covariate.</a:t>
-            </a:r>
-          </a:p>
-          <a:p>
-            <a:pPr algn="l"/>
-            <a:endParaRPr lang="en-US" sz="3000" dirty="0">
-              <a:latin typeface="PFDinTextCompPro-Italic"/>
-              <a:cs typeface="PFDinTextCompPro-Italic"/>
-            </a:endParaRPr>
-          </a:p>
-          <a:p>
-            <a:pPr algn="l"/>
-            <a:r>
-              <a:rPr lang="en-US" sz="3000" dirty="0" smtClean="0">
-                <a:latin typeface="PFDinTextCompPro-Italic"/>
-                <a:cs typeface="PFDinTextCompPro-Italic"/>
-              </a:rPr>
-              <a:t>In logistic regression, </a:t>
-            </a:r>
-            <a:r>
-              <a:rPr lang="en-US" sz="3000" i="1" dirty="0" smtClean="0">
-                <a:latin typeface="Symbol" charset="2"/>
-                <a:cs typeface="Symbol" charset="2"/>
-              </a:rPr>
-              <a:t>b</a:t>
-            </a:r>
-            <a:r>
-              <a:rPr lang="en-US" sz="3000" dirty="0" smtClean="0">
-                <a:latin typeface="PFDinTextCompPro-Italic"/>
-                <a:cs typeface="PFDinTextCompPro-Italic"/>
-              </a:rPr>
-              <a:t> represents the change in the </a:t>
-            </a:r>
-            <a:r>
-              <a:rPr lang="en-US" sz="3000" dirty="0" err="1" smtClean="0">
-                <a:latin typeface="PFDinTextCompPro-Italic"/>
-                <a:cs typeface="PFDinTextCompPro-Italic"/>
-              </a:rPr>
-              <a:t>logit</a:t>
-            </a:r>
-            <a:r>
-              <a:rPr lang="en-US" sz="3000" dirty="0" smtClean="0">
-                <a:latin typeface="PFDinTextCompPro-Italic"/>
-                <a:cs typeface="PFDinTextCompPro-Italic"/>
-              </a:rPr>
-              <a:t> function for a unit change in the covariate.</a:t>
-            </a:r>
-          </a:p>
-          <a:p>
-            <a:pPr algn="l"/>
-            <a:endParaRPr lang="en-US" sz="3000" dirty="0">
-              <a:latin typeface="PFDinTextCompPro-Italic"/>
-              <a:cs typeface="PFDinTextCompPro-Italic"/>
-            </a:endParaRPr>
-          </a:p>
-          <a:p>
-            <a:pPr algn="l"/>
-            <a:r>
-              <a:rPr lang="en-US" sz="3000" dirty="0" smtClean="0">
-                <a:latin typeface="PFDinTextCompPro-Italic"/>
-                <a:cs typeface="PFDinTextCompPro-Italic"/>
-              </a:rPr>
-              <a:t>Interpreting this change in the </a:t>
-            </a:r>
-            <a:r>
-              <a:rPr lang="en-US" sz="3000" dirty="0" err="1" smtClean="0">
-                <a:latin typeface="PFDinTextCompPro-Italic"/>
-                <a:cs typeface="PFDinTextCompPro-Italic"/>
-              </a:rPr>
-              <a:t>logit</a:t>
-            </a:r>
-            <a:r>
-              <a:rPr lang="en-US" sz="3000" dirty="0" smtClean="0">
-                <a:latin typeface="PFDinTextCompPro-Italic"/>
-                <a:cs typeface="PFDinTextCompPro-Italic"/>
-              </a:rPr>
-              <a:t> function requires another definition first.</a:t>
-            </a:r>
-          </a:p>
-        </p:txBody>
-      </p:sp>
-    </p:spTree>
-    <p:extLst>
-      <p:ext uri="{BB962C8B-B14F-4D97-AF65-F5344CB8AC3E}">
-        <p14:creationId xmlns:p14="http://schemas.microsoft.com/office/powerpoint/2010/main" val="874680083"/>
-      </p:ext>
-    </p:extLst>
-  </p:cSld>
-  <p:clrMapOvr>
-    <a:masterClrMapping/>
-  </p:clrMapOvr>
-  <p:transition xmlns:p14="http://schemas.microsoft.com/office/powerpoint/2010/main"/>
-  <p:timing>
-    <p:tnLst>
-      <p:par>
-        <p:cTn xmlns:p14="http://schemas.microsoft.com/office/powerpoint/2010/main" id="1" dur="indefinite" restart="never" nodeType="tmRoot"/>
-      </p:par>
-    </p:tnLst>
-  </p:timing>
-</p:sld>
-</file>
-
-<file path=ppt/slides/slide44.xml><?xml version="1.0" encoding="utf-8"?>
-<p:sld xmlns:a="http://schemas.openxmlformats.org/drawingml/2006/main" xmlns:r="http://schemas.openxmlformats.org/officeDocument/2006/relationships" xmlns:p="http://schemas.openxmlformats.org/presentationml/2006/main">
-  <p:cSld>
-    <p:spTree>
-      <p:nvGrpSpPr>
-        <p:cNvPr id="1" name=""/>
-        <p:cNvGrpSpPr/>
-        <p:nvPr/>
-      </p:nvGrpSpPr>
-      <p:grpSpPr>
-        <a:xfrm>
-          <a:off x="0" y="0"/>
-          <a:ext cx="0" cy="0"/>
-          <a:chOff x="0" y="0"/>
-          <a:chExt cx="0" cy="0"/>
-        </a:xfrm>
-      </p:grpSpPr>
-      <p:sp>
-        <p:nvSpPr>
-          <p:cNvPr id="4" name="Content Placeholder 3"/>
-          <p:cNvSpPr>
-            <a:spLocks noGrp="1"/>
-          </p:cNvSpPr>
-          <p:nvPr>
-            <p:ph sz="quarter" idx="11"/>
-          </p:nvPr>
-        </p:nvSpPr>
-        <p:spPr>
-          <a:xfrm>
-            <a:off x="414337" y="495300"/>
-            <a:ext cx="6400800" cy="304800"/>
-          </a:xfrm>
-        </p:spPr>
-        <p:txBody>
-          <a:bodyPr/>
-          <a:lstStyle/>
-          <a:p>
-            <a:pPr eaLnBrk="1" hangingPunct="1">
-              <a:lnSpc>
-                <a:spcPts val="2448"/>
-              </a:lnSpc>
-              <a:defRPr/>
-            </a:pPr>
-            <a:r>
-              <a:rPr lang="en-US" dirty="0" smtClean="0"/>
-              <a:t>Interpreting results</a:t>
-            </a:r>
-            <a:endParaRPr lang="en-US" dirty="0"/>
-          </a:p>
-        </p:txBody>
-      </p:sp>
-      <p:sp>
-        <p:nvSpPr>
-          <p:cNvPr id="8" name="Slide Number Placeholder 3"/>
-          <p:cNvSpPr>
-            <a:spLocks noGrp="1"/>
-          </p:cNvSpPr>
-          <p:nvPr>
-            <p:ph type="sldNum" sz="quarter" idx="13"/>
-          </p:nvPr>
-        </p:nvSpPr>
-        <p:spPr/>
-        <p:txBody>
-          <a:bodyPr/>
-          <a:lstStyle/>
-          <a:p>
-            <a:pPr>
-              <a:defRPr/>
-            </a:pPr>
-            <a:fld id="{BD5AD749-DAD1-6A4A-A2AA-CB20EAD0AEB7}" type="slidenum">
-              <a:rPr lang="en-US"/>
-              <a:pPr>
-                <a:defRPr/>
-              </a:pPr>
-              <a:t>44</a:t>
             </a:fld>
             <a:endParaRPr lang="en-US"/>
           </a:p>
@@ -21836,7 +21261,7 @@
 </p:sld>
 </file>
 
-<file path=ppt/slides/slide45.xml><?xml version="1.0" encoding="utf-8"?>
+<file path=ppt/slides/slide44.xml><?xml version="1.0" encoding="utf-8"?>
 <p:sld xmlns:a="http://schemas.openxmlformats.org/drawingml/2006/main" xmlns:r="http://schemas.openxmlformats.org/officeDocument/2006/relationships" xmlns:p="http://schemas.openxmlformats.org/presentationml/2006/main">
   <p:cSld>
     <p:spTree>
@@ -21910,7 +21335,7 @@
               <a:pPr>
                 <a:defRPr/>
               </a:pPr>
-              <a:t>45</a:t>
+              <a:t>44</a:t>
             </a:fld>
             <a:endParaRPr lang="en-US"/>
           </a:p>
@@ -22070,7 +21495,7 @@
 </p:sld>
 </file>
 
-<file path=ppt/slides/slide46.xml><?xml version="1.0" encoding="utf-8"?>
+<file path=ppt/slides/slide45.xml><?xml version="1.0" encoding="utf-8"?>
 <p:sld xmlns:a="http://schemas.openxmlformats.org/drawingml/2006/main" xmlns:r="http://schemas.openxmlformats.org/officeDocument/2006/relationships" xmlns:p="http://schemas.openxmlformats.org/presentationml/2006/main">
   <p:cSld>
     <p:spTree>
@@ -22144,7 +21569,7 @@
               <a:pPr>
                 <a:defRPr/>
               </a:pPr>
-              <a:t>46</a:t>
+              <a:t>45</a:t>
             </a:fld>
             <a:endParaRPr lang="en-US"/>
           </a:p>
@@ -22256,7 +21681,7 @@
 </p:sld>
 </file>
 
-<file path=ppt/slides/slide47.xml><?xml version="1.0" encoding="utf-8"?>
+<file path=ppt/slides/slide46.xml><?xml version="1.0" encoding="utf-8"?>
 <p:sld xmlns:a="http://schemas.openxmlformats.org/drawingml/2006/main" xmlns:r="http://schemas.openxmlformats.org/officeDocument/2006/relationships" xmlns:p="http://schemas.openxmlformats.org/presentationml/2006/main">
   <p:cSld>
     <p:spTree>
@@ -22330,7 +21755,7 @@
               <a:pPr>
                 <a:defRPr/>
               </a:pPr>
-              <a:t>47</a:t>
+              <a:t>46</a:t>
             </a:fld>
             <a:endParaRPr lang="en-US"/>
           </a:p>
@@ -22480,6 +21905,147 @@
 </p:sld>
 </file>
 
+<file path=ppt/slides/slide47.xml><?xml version="1.0" encoding="utf-8"?>
+<p:sld xmlns:a="http://schemas.openxmlformats.org/drawingml/2006/main" xmlns:r="http://schemas.openxmlformats.org/officeDocument/2006/relationships" xmlns:p="http://schemas.openxmlformats.org/presentationml/2006/main">
+  <p:cSld>
+    <p:spTree>
+      <p:nvGrpSpPr>
+        <p:cNvPr id="1" name=""/>
+        <p:cNvGrpSpPr/>
+        <p:nvPr/>
+      </p:nvGrpSpPr>
+      <p:grpSpPr>
+        <a:xfrm>
+          <a:off x="0" y="0"/>
+          <a:ext cx="0" cy="0"/>
+          <a:chOff x="0" y="0"/>
+          <a:chExt cx="0" cy="0"/>
+        </a:xfrm>
+      </p:grpSpPr>
+      <p:sp>
+        <p:nvSpPr>
+          <p:cNvPr id="4" name="Content Placeholder 3"/>
+          <p:cNvSpPr>
+            <a:spLocks noGrp="1"/>
+          </p:cNvSpPr>
+          <p:nvPr>
+            <p:ph sz="quarter" idx="11"/>
+          </p:nvPr>
+        </p:nvSpPr>
+        <p:spPr>
+          <a:xfrm>
+            <a:off x="414337" y="495300"/>
+            <a:ext cx="6400800" cy="304800"/>
+          </a:xfrm>
+        </p:spPr>
+        <p:txBody>
+          <a:bodyPr/>
+          <a:lstStyle/>
+          <a:p>
+            <a:pPr eaLnBrk="1" hangingPunct="1">
+              <a:lnSpc>
+                <a:spcPts val="2448"/>
+              </a:lnSpc>
+              <a:defRPr/>
+            </a:pPr>
+            <a:r>
+              <a:rPr lang="en-US" dirty="0" smtClean="0"/>
+              <a:t>Interpreting results</a:t>
+            </a:r>
+            <a:endParaRPr lang="en-US" dirty="0"/>
+          </a:p>
+        </p:txBody>
+      </p:sp>
+      <p:sp>
+        <p:nvSpPr>
+          <p:cNvPr id="8" name="Slide Number Placeholder 3"/>
+          <p:cNvSpPr>
+            <a:spLocks noGrp="1"/>
+          </p:cNvSpPr>
+          <p:nvPr>
+            <p:ph type="sldNum" sz="quarter" idx="13"/>
+          </p:nvPr>
+        </p:nvSpPr>
+        <p:spPr/>
+        <p:txBody>
+          <a:bodyPr/>
+          <a:lstStyle/>
+          <a:p>
+            <a:pPr>
+              <a:defRPr/>
+            </a:pPr>
+            <a:fld id="{BD5AD749-DAD1-6A4A-A2AA-CB20EAD0AEB7}" type="slidenum">
+              <a:rPr lang="en-US"/>
+              <a:pPr>
+                <a:defRPr/>
+              </a:pPr>
+              <a:t>47</a:t>
+            </a:fld>
+            <a:endParaRPr lang="en-US"/>
+          </a:p>
+        </p:txBody>
+      </p:sp>
+      <p:sp>
+        <p:nvSpPr>
+          <p:cNvPr id="9" name="TextBox 8"/>
+          <p:cNvSpPr txBox="1"/>
+          <p:nvPr/>
+        </p:nvSpPr>
+        <p:spPr>
+          <a:xfrm>
+            <a:off x="566737" y="952500"/>
+            <a:ext cx="8382000" cy="1015663"/>
+          </a:xfrm>
+          <a:prstGeom prst="rect">
+            <a:avLst/>
+          </a:prstGeom>
+          <a:noFill/>
+        </p:spPr>
+        <p:txBody>
+          <a:bodyPr wrap="square" rtlCol="0">
+            <a:spAutoFit/>
+          </a:bodyPr>
+          <a:lstStyle/>
+          <a:p>
+            <a:pPr algn="l"/>
+            <a:endParaRPr lang="en-US" sz="3000" dirty="0" smtClean="0">
+              <a:latin typeface="PFDinTextCompPro-Italic"/>
+              <a:cs typeface="PFDinTextCompPro-Italic"/>
+            </a:endParaRPr>
+          </a:p>
+          <a:p>
+            <a:pPr algn="l"/>
+            <a:r>
+              <a:rPr lang="en-US" sz="3000" dirty="0" smtClean="0">
+                <a:latin typeface="PFDinTextCompPro-Italic"/>
+                <a:cs typeface="PFDinTextCompPro-Italic"/>
+              </a:rPr>
+              <a:t>Q: So how do we interpret this?</a:t>
+            </a:r>
+          </a:p>
+        </p:txBody>
+      </p:sp>
+    </p:spTree>
+    <p:extLst>
+      <p:ext uri="{BB962C8B-B14F-4D97-AF65-F5344CB8AC3E}">
+        <p14:creationId xmlns:p14="http://schemas.microsoft.com/office/powerpoint/2010/main" val="2616159861"/>
+      </p:ext>
+    </p:extLst>
+  </p:cSld>
+  <p:clrMapOvr>
+    <a:masterClrMapping/>
+  </p:clrMapOvr>
+  <p:transition xmlns:p14="http://schemas.microsoft.com/office/powerpoint/2010/main"/>
+  <p:timing>
+    <p:tnLst>
+      <p:par>
+        <p:cTn xmlns:p14="http://schemas.microsoft.com/office/powerpoint/2010/main" id="1" dur="indefinite" restart="never" nodeType="tmRoot"/>
+      </p:par>
+    </p:tnLst>
+  </p:timing>
+</p:sld>
+</file>
+
 <file path=ppt/slides/slide48.xml><?xml version="1.0" encoding="utf-8"?>
 <p:sld xmlns:a="http://schemas.openxmlformats.org/drawingml/2006/main" xmlns:r="http://schemas.openxmlformats.org/officeDocument/2006/relationships" xmlns:p="http://schemas.openxmlformats.org/presentationml/2006/main">
   <p:cSld>
@@ -22569,7 +22135,7 @@
         <p:spPr>
           <a:xfrm>
             <a:off x="566737" y="952500"/>
-            <a:ext cx="8382000" cy="1015663"/>
+            <a:ext cx="8382000" cy="2400657"/>
           </a:xfrm>
           <a:prstGeom prst="rect">
             <a:avLst/>
@@ -22598,12 +22164,75 @@
               <a:t>Q: So how do we interpret this?</a:t>
             </a:r>
           </a:p>
+          <a:p>
+            <a:pPr algn="l"/>
+            <a:endParaRPr lang="en-US" sz="3000" dirty="0">
+              <a:latin typeface="PFDinTextCompPro-Italic"/>
+              <a:cs typeface="PFDinTextCompPro-Italic"/>
+            </a:endParaRPr>
+          </a:p>
+          <a:p>
+            <a:pPr algn="l"/>
+            <a:r>
+              <a:rPr lang="en-US" sz="3000" dirty="0" smtClean="0">
+                <a:latin typeface="PFDinTextCompPro-Italic"/>
+                <a:cs typeface="PFDinTextCompPro-Italic"/>
+              </a:rPr>
+              <a:t>A: The </a:t>
+            </a:r>
+            <a:r>
+              <a:rPr lang="en-US" sz="3000" dirty="0">
+                <a:latin typeface="PFDinTextCompPro-Italic"/>
+                <a:cs typeface="PFDinTextCompPro-Italic"/>
+              </a:rPr>
+              <a:t>odds ratio of a binary event </a:t>
+            </a:r>
+            <a:r>
+              <a:rPr lang="en-US" sz="3000" dirty="0" smtClean="0">
+                <a:latin typeface="PFDinTextCompPro-Italic"/>
+                <a:cs typeface="PFDinTextCompPro-Italic"/>
+              </a:rPr>
+              <a:t>gives the </a:t>
+            </a:r>
+            <a:r>
+              <a:rPr lang="en-US" sz="3000" dirty="0">
+                <a:latin typeface="PFDinTextCompPro-Italic"/>
+                <a:cs typeface="PFDinTextCompPro-Italic"/>
+              </a:rPr>
+              <a:t>increase </a:t>
+            </a:r>
+            <a:r>
+              <a:rPr lang="en-US" sz="3000" dirty="0" smtClean="0">
+                <a:latin typeface="PFDinTextCompPro-Italic"/>
+                <a:cs typeface="PFDinTextCompPro-Italic"/>
+              </a:rPr>
+              <a:t>in likelihood of an outcome if </a:t>
+            </a:r>
+            <a:r>
+              <a:rPr lang="en-US" sz="3000" dirty="0">
+                <a:latin typeface="PFDinTextCompPro-Italic"/>
+                <a:cs typeface="PFDinTextCompPro-Italic"/>
+              </a:rPr>
+              <a:t>the event occurs</a:t>
+            </a:r>
+            <a:r>
+              <a:rPr lang="en-US" sz="3000" dirty="0" smtClean="0">
+                <a:latin typeface="PFDinTextCompPro-Italic"/>
+                <a:cs typeface="PFDinTextCompPro-Italic"/>
+              </a:rPr>
+              <a:t>.</a:t>
+            </a:r>
+            <a:endParaRPr lang="en-US" sz="3000" dirty="0">
+              <a:latin typeface="PFDinTextCompPro-Italic"/>
+              <a:cs typeface="PFDinTextCompPro-Italic"/>
+            </a:endParaRPr>
+          </a:p>
         </p:txBody>
       </p:sp>
     </p:spTree>
     <p:extLst>
       <p:ext uri="{BB962C8B-B14F-4D97-AF65-F5344CB8AC3E}">
-        <p14:creationId xmlns:p14="http://schemas.microsoft.com/office/powerpoint/2010/main" val="2616159861"/>
+        <p14:creationId xmlns:p14="http://schemas.microsoft.com/office/powerpoint/2010/main" val="3279794766"/>
       </p:ext>
     </p:extLst>
   </p:cSld>
@@ -22666,7 +22295,7 @@
             </a:pPr>
             <a:r>
               <a:rPr lang="en-US" dirty="0" smtClean="0"/>
-              <a:t>Interpreting results</a:t>
+              <a:t>Interpreting results – An example</a:t>
             </a:r>
             <a:endParaRPr lang="en-US" dirty="0"/>
           </a:p>
@@ -22710,7 +22339,7 @@
         <p:spPr>
           <a:xfrm>
             <a:off x="566737" y="952500"/>
-            <a:ext cx="8382000" cy="2400657"/>
+            <a:ext cx="8382000" cy="1938992"/>
           </a:xfrm>
           <a:prstGeom prst="rect">
             <a:avLst/>
@@ -22736,78 +22365,29 @@
                 <a:latin typeface="PFDinTextCompPro-Italic"/>
                 <a:cs typeface="PFDinTextCompPro-Italic"/>
               </a:rPr>
-              <a:t>Q: So how do we interpret this?</a:t>
-            </a:r>
-          </a:p>
-          <a:p>
-            <a:pPr algn="l"/>
-            <a:endParaRPr lang="en-US" sz="3000" dirty="0">
-              <a:latin typeface="PFDinTextCompPro-Italic"/>
-              <a:cs typeface="PFDinTextCompPro-Italic"/>
-            </a:endParaRPr>
-          </a:p>
-          <a:p>
-            <a:pPr algn="l"/>
+              <a:t>Suppose we are interested in mobile purchase behavior. Let y be a class label denoting purchase/no purchase, and let x denote a mobile OS (for example, </a:t>
+            </a:r>
+            <a:r>
+              <a:rPr lang="en-US" sz="3000" dirty="0" err="1" smtClean="0">
+                <a:latin typeface="PFDinTextCompPro-Italic"/>
+                <a:cs typeface="PFDinTextCompPro-Italic"/>
+              </a:rPr>
+              <a:t>iOS</a:t>
+            </a:r>
             <a:r>
               <a:rPr lang="en-US" sz="3000" dirty="0" smtClean="0">
                 <a:latin typeface="PFDinTextCompPro-Italic"/>
                 <a:cs typeface="PFDinTextCompPro-Italic"/>
               </a:rPr>
-              <a:t>A: The </a:t>
-            </a:r>
-            <a:r>
-              <a:rPr lang="en-US" sz="3000" dirty="0">
-                <a:latin typeface="PFDinTextCompPro-Italic"/>
-                <a:cs typeface="PFDinTextCompPro-Italic"/>
-              </a:rPr>
-              <a:t>odds ratio of a binary event </a:t>
-            </a:r>
-            <a:r>
-              <a:rPr lang="en-US" sz="3000" dirty="0" smtClean="0">
-                <a:latin typeface="PFDinTextCompPro-Italic"/>
-                <a:cs typeface="PFDinTextCompPro-Italic"/>
-              </a:rPr>
-              <a:t>gives the </a:t>
-            </a:r>
-            <a:r>
-              <a:rPr lang="en-US" sz="3000" dirty="0">
-                <a:latin typeface="PFDinTextCompPro-Italic"/>
-                <a:cs typeface="PFDinTextCompPro-Italic"/>
-              </a:rPr>
-              <a:t>increase </a:t>
-            </a:r>
-            <a:r>
-              <a:rPr lang="en-US" sz="3000" dirty="0" smtClean="0">
-                <a:latin typeface="PFDinTextCompPro-Italic"/>
-                <a:cs typeface="PFDinTextCompPro-Italic"/>
-              </a:rPr>
-              <a:t>in likelihood of an outcome if </a:t>
-            </a:r>
-            <a:r>
-              <a:rPr lang="en-US" sz="3000" dirty="0">
-                <a:latin typeface="PFDinTextCompPro-Italic"/>
-                <a:cs typeface="PFDinTextCompPro-Italic"/>
-              </a:rPr>
-              <a:t>the event occurs</a:t>
-            </a:r>
-            <a:r>
-              <a:rPr lang="en-US" sz="3000" dirty="0" smtClean="0">
-                <a:latin typeface="PFDinTextCompPro-Italic"/>
-                <a:cs typeface="PFDinTextCompPro-Italic"/>
-              </a:rPr>
-              <a:t>.</a:t>
-            </a:r>
-            <a:endParaRPr lang="en-US" sz="3000" dirty="0">
-              <a:latin typeface="PFDinTextCompPro-Italic"/>
-              <a:cs typeface="PFDinTextCompPro-Italic"/>
-            </a:endParaRPr>
+              <a:t>).</a:t>
+            </a:r>
           </a:p>
         </p:txBody>
       </p:sp>
     </p:spTree>
     <p:extLst>
       <p:ext uri="{BB962C8B-B14F-4D97-AF65-F5344CB8AC3E}">
-        <p14:creationId xmlns:p14="http://schemas.microsoft.com/office/powerpoint/2010/main" val="3279794766"/>
+        <p14:creationId xmlns:p14="http://schemas.microsoft.com/office/powerpoint/2010/main" val="3491433904"/>
       </p:ext>
     </p:extLst>
   </p:cSld>
@@ -23266,7 +22846,7 @@
         <p:spPr>
           <a:xfrm>
             <a:off x="566737" y="952500"/>
-            <a:ext cx="8382000" cy="1938992"/>
+            <a:ext cx="8382000" cy="3785652"/>
           </a:xfrm>
           <a:prstGeom prst="rect">
             <a:avLst/>
@@ -23308,6 +22888,114 @@
               </a:rPr>
               <a:t>).</a:t>
             </a:r>
+          </a:p>
+          <a:p>
+            <a:pPr algn="l"/>
+            <a:endParaRPr lang="en-US" sz="3000" dirty="0">
+              <a:latin typeface="PFDinTextCompPro-Italic"/>
+              <a:cs typeface="PFDinTextCompPro-Italic"/>
+            </a:endParaRPr>
+          </a:p>
+          <a:p>
+            <a:pPr algn="l"/>
+            <a:r>
+              <a:rPr lang="en-US" sz="3000" dirty="0">
+                <a:latin typeface="PFDinTextCompPro-Italic"/>
+                <a:cs typeface="PFDinTextCompPro-Italic"/>
+              </a:rPr>
+              <a:t>In this case, </a:t>
+            </a:r>
+            <a:r>
+              <a:rPr lang="en-US" sz="3000" dirty="0" smtClean="0">
+                <a:latin typeface="PFDinTextCompPro-Italic"/>
+                <a:cs typeface="PFDinTextCompPro-Italic"/>
+              </a:rPr>
+              <a:t>an odds </a:t>
+            </a:r>
+            <a:r>
+              <a:rPr lang="en-US" sz="3000" dirty="0">
+                <a:latin typeface="PFDinTextCompPro-Italic"/>
+                <a:cs typeface="PFDinTextCompPro-Italic"/>
+              </a:rPr>
+              <a:t>ratio of </a:t>
+            </a:r>
+            <a:r>
+              <a:rPr lang="en-US" sz="3000" dirty="0" smtClean="0">
+                <a:latin typeface="PFDinTextCompPro-Italic"/>
+                <a:cs typeface="PFDinTextCompPro-Italic"/>
+              </a:rPr>
+              <a:t>2 (</a:t>
+            </a:r>
+            <a:r>
+              <a:rPr lang="en-US" sz="3000" dirty="0" err="1" smtClean="0">
+                <a:latin typeface="PFDinTextCompPro-Italic"/>
+                <a:cs typeface="PFDinTextCompPro-Italic"/>
+              </a:rPr>
+              <a:t>eg</a:t>
+            </a:r>
+            <a:r>
+              <a:rPr lang="en-US" sz="3000" dirty="0" smtClean="0">
+                <a:latin typeface="PFDinTextCompPro-Italic"/>
+                <a:cs typeface="PFDinTextCompPro-Italic"/>
+              </a:rPr>
+              <a:t>, </a:t>
+            </a:r>
+            <a:r>
+              <a:rPr lang="en-US" sz="3000" i="1" dirty="0" smtClean="0">
+                <a:latin typeface="Symbol" charset="2"/>
+                <a:cs typeface="Symbol" charset="2"/>
+              </a:rPr>
+              <a:t>b</a:t>
+            </a:r>
+            <a:r>
+              <a:rPr lang="en-US" sz="3000" dirty="0" smtClean="0">
+                <a:latin typeface="PFDinTextCompPro-Italic"/>
+                <a:cs typeface="PFDinTextCompPro-Italic"/>
+              </a:rPr>
+              <a:t> = log(2)) indicates </a:t>
+            </a:r>
+            <a:r>
+              <a:rPr lang="en-US" sz="3000" dirty="0">
+                <a:latin typeface="PFDinTextCompPro-Italic"/>
+                <a:cs typeface="PFDinTextCompPro-Italic"/>
+              </a:rPr>
+              <a:t>that a purchase is twice as likely for an </a:t>
+            </a:r>
+            <a:r>
+              <a:rPr lang="en-US" sz="3000" dirty="0" err="1">
+                <a:latin typeface="PFDinTextCompPro-Italic"/>
+                <a:cs typeface="PFDinTextCompPro-Italic"/>
+              </a:rPr>
+              <a:t>iOS</a:t>
+            </a:r>
+            <a:r>
+              <a:rPr lang="en-US" sz="3000" dirty="0">
+                <a:latin typeface="PFDinTextCompPro-Italic"/>
+                <a:cs typeface="PFDinTextCompPro-Italic"/>
+              </a:rPr>
+              <a:t> user as for a non-</a:t>
+            </a:r>
+            <a:r>
+              <a:rPr lang="en-US" sz="3000" dirty="0" err="1">
+                <a:latin typeface="PFDinTextCompPro-Italic"/>
+                <a:cs typeface="PFDinTextCompPro-Italic"/>
+              </a:rPr>
+              <a:t>iOS</a:t>
+            </a:r>
+            <a:r>
+              <a:rPr lang="en-US" sz="3000" dirty="0">
+                <a:latin typeface="PFDinTextCompPro-Italic"/>
+                <a:cs typeface="PFDinTextCompPro-Italic"/>
+              </a:rPr>
+              <a:t> user.</a:t>
+            </a:r>
+          </a:p>
+          <a:p>
+            <a:pPr algn="l"/>
+            <a:endParaRPr lang="en-US" sz="3000" dirty="0" smtClean="0">
+              <a:latin typeface="PFDinTextCompPro-Italic"/>
+              <a:cs typeface="PFDinTextCompPro-Italic"/>
+            </a:endParaRPr>
           </a:p>
         </p:txBody>
       </p:sp>
@@ -23351,225 +23039,79 @@
       </p:grpSpPr>
       <p:sp>
         <p:nvSpPr>
-          <p:cNvPr id="4" name="Content Placeholder 3"/>
-          <p:cNvSpPr>
-            <a:spLocks noGrp="1"/>
-          </p:cNvSpPr>
-          <p:nvPr>
-            <p:ph sz="quarter" idx="11"/>
+          <p:cNvPr id="2" name="Title 1"/>
+          <p:cNvSpPr>
+            <a:spLocks noGrp="1"/>
+          </p:cNvSpPr>
+          <p:nvPr>
+            <p:ph type="title"/>
           </p:nvPr>
         </p:nvSpPr>
         <p:spPr>
           <a:xfrm>
-            <a:off x="414337" y="495300"/>
+            <a:off x="347663" y="3467100"/>
+            <a:ext cx="8426450" cy="1828800"/>
+          </a:xfrm>
+        </p:spPr>
+        <p:txBody>
+          <a:bodyPr/>
+          <a:lstStyle/>
+          <a:p>
+            <a:pPr>
+              <a:defRPr/>
+            </a:pPr>
+            <a:r>
+              <a:rPr lang="en-US" sz="7500" dirty="0" smtClean="0"/>
+              <a:t/>
+            </a:r>
+            <a:br>
+              <a:rPr lang="en-US" sz="7500" dirty="0" smtClean="0"/>
+            </a:br>
+            <a:r>
+              <a:rPr lang="en-US" sz="7500" dirty="0" smtClean="0"/>
+              <a:t>Ex: logistic regression</a:t>
+            </a:r>
+            <a:endParaRPr lang="en-US" sz="7500" dirty="0"/>
+          </a:p>
+        </p:txBody>
+      </p:sp>
+      <p:sp>
+        <p:nvSpPr>
+          <p:cNvPr id="4" name="Content Placeholder 3"/>
+          <p:cNvSpPr>
+            <a:spLocks noGrp="1"/>
+          </p:cNvSpPr>
+          <p:nvPr>
+            <p:ph sz="quarter" idx="11"/>
+          </p:nvPr>
+        </p:nvSpPr>
+        <p:spPr>
+          <a:xfrm>
+            <a:off x="371475" y="495300"/>
             <a:ext cx="6400800" cy="304800"/>
           </a:xfrm>
         </p:spPr>
         <p:txBody>
-          <a:bodyPr/>
-          <a:lstStyle/>
-          <a:p>
-            <a:pPr eaLnBrk="1" hangingPunct="1">
-              <a:lnSpc>
-                <a:spcPts val="2448"/>
-              </a:lnSpc>
-              <a:defRPr/>
-            </a:pPr>
-            <a:r>
-              <a:rPr lang="en-US" dirty="0" smtClean="0"/>
-              <a:t>Interpreting results – An example</a:t>
-            </a:r>
-            <a:endParaRPr lang="en-US" dirty="0"/>
-          </a:p>
-        </p:txBody>
-      </p:sp>
-      <p:sp>
-        <p:nvSpPr>
-          <p:cNvPr id="8" name="Slide Number Placeholder 3"/>
-          <p:cNvSpPr>
-            <a:spLocks noGrp="1"/>
-          </p:cNvSpPr>
-          <p:nvPr>
-            <p:ph type="sldNum" sz="quarter" idx="13"/>
-          </p:nvPr>
-        </p:nvSpPr>
-        <p:spPr/>
-        <p:txBody>
-          <a:bodyPr/>
-          <a:lstStyle/>
-          <a:p>
-            <a:pPr>
-              <a:defRPr/>
-            </a:pPr>
-            <a:fld id="{BD5AD749-DAD1-6A4A-A2AA-CB20EAD0AEB7}" type="slidenum">
-              <a:rPr lang="en-US"/>
-              <a:pPr>
-                <a:defRPr/>
-              </a:pPr>
-              <a:t>51</a:t>
-            </a:fld>
-            <a:endParaRPr lang="en-US"/>
-          </a:p>
-        </p:txBody>
-      </p:sp>
-      <p:sp>
-        <p:nvSpPr>
-          <p:cNvPr id="9" name="TextBox 8"/>
-          <p:cNvSpPr txBox="1"/>
-          <p:nvPr/>
-        </p:nvSpPr>
-        <p:spPr>
-          <a:xfrm>
-            <a:off x="566737" y="952500"/>
-            <a:ext cx="8382000" cy="3785652"/>
-          </a:xfrm>
-          <a:prstGeom prst="rect">
-            <a:avLst/>
-          </a:prstGeom>
-          <a:noFill/>
-        </p:spPr>
-        <p:txBody>
-          <a:bodyPr wrap="square" rtlCol="0">
-            <a:spAutoFit/>
+          <a:bodyPr wrap="square" lIns="91440" tIns="45720" rIns="91440" bIns="45720" numCol="1" anchor="t" anchorCtr="0" compatLnSpc="1">
+            <a:prstTxWarp prst="textNoShape">
+              <a:avLst/>
+            </a:prstTxWarp>
           </a:bodyPr>
           <a:lstStyle/>
           <a:p>
-            <a:pPr algn="l"/>
-            <a:endParaRPr lang="en-US" sz="3000" dirty="0" smtClean="0">
-              <a:latin typeface="PFDinTextCompPro-Italic"/>
-              <a:cs typeface="PFDinTextCompPro-Italic"/>
-            </a:endParaRPr>
-          </a:p>
-          <a:p>
-            <a:pPr algn="l"/>
-            <a:r>
-              <a:rPr lang="en-US" sz="3000" dirty="0" smtClean="0">
-                <a:latin typeface="PFDinTextCompPro-Italic"/>
-                <a:cs typeface="PFDinTextCompPro-Italic"/>
-              </a:rPr>
-              <a:t>Suppose we are interested in mobile purchase behavior. Let y be a class label denoting purchase/no purchase, and let x denote a mobile OS (for example, </a:t>
-            </a:r>
-            <a:r>
-              <a:rPr lang="en-US" sz="3000" dirty="0" err="1" smtClean="0">
-                <a:latin typeface="PFDinTextCompPro-Italic"/>
-                <a:cs typeface="PFDinTextCompPro-Italic"/>
-              </a:rPr>
-              <a:t>iOS</a:t>
-            </a:r>
-            <a:r>
-              <a:rPr lang="en-US" sz="3000" dirty="0" smtClean="0">
-                <a:latin typeface="PFDinTextCompPro-Italic"/>
-                <a:cs typeface="PFDinTextCompPro-Italic"/>
-              </a:rPr>
-              <a:t>).</a:t>
-            </a:r>
-          </a:p>
-          <a:p>
-            <a:pPr algn="l"/>
-            <a:endParaRPr lang="en-US" sz="3000" dirty="0">
-              <a:latin typeface="PFDinTextCompPro-Italic"/>
-              <a:cs typeface="PFDinTextCompPro-Italic"/>
-            </a:endParaRPr>
-          </a:p>
-          <a:p>
-            <a:pPr algn="l"/>
-            <a:r>
-              <a:rPr lang="en-US" sz="3000" dirty="0">
-                <a:latin typeface="PFDinTextCompPro-Italic"/>
-                <a:cs typeface="PFDinTextCompPro-Italic"/>
-              </a:rPr>
-              <a:t>In this case, </a:t>
-            </a:r>
-            <a:r>
-              <a:rPr lang="en-US" sz="3000" dirty="0" smtClean="0">
-                <a:latin typeface="PFDinTextCompPro-Italic"/>
-                <a:cs typeface="PFDinTextCompPro-Italic"/>
-              </a:rPr>
-              <a:t>an odds </a:t>
-            </a:r>
-            <a:r>
-              <a:rPr lang="en-US" sz="3000" dirty="0">
-                <a:latin typeface="PFDinTextCompPro-Italic"/>
-                <a:cs typeface="PFDinTextCompPro-Italic"/>
-              </a:rPr>
-              <a:t>ratio of </a:t>
-            </a:r>
-            <a:r>
-              <a:rPr lang="en-US" sz="3000" dirty="0" smtClean="0">
-                <a:latin typeface="PFDinTextCompPro-Italic"/>
-                <a:cs typeface="PFDinTextCompPro-Italic"/>
-              </a:rPr>
-              <a:t>2 (</a:t>
-            </a:r>
-            <a:r>
-              <a:rPr lang="en-US" sz="3000" dirty="0" err="1" smtClean="0">
-                <a:latin typeface="PFDinTextCompPro-Italic"/>
-                <a:cs typeface="PFDinTextCompPro-Italic"/>
-              </a:rPr>
-              <a:t>eg</a:t>
-            </a:r>
-            <a:r>
-              <a:rPr lang="en-US" sz="3000" dirty="0" smtClean="0">
-                <a:latin typeface="PFDinTextCompPro-Italic"/>
-                <a:cs typeface="PFDinTextCompPro-Italic"/>
-              </a:rPr>
-              <a:t>, </a:t>
-            </a:r>
-            <a:r>
-              <a:rPr lang="en-US" sz="3000" i="1" dirty="0" smtClean="0">
-                <a:latin typeface="Symbol" charset="2"/>
-                <a:cs typeface="Symbol" charset="2"/>
-              </a:rPr>
-              <a:t>b</a:t>
-            </a:r>
-            <a:r>
-              <a:rPr lang="en-US" sz="3000" dirty="0" smtClean="0">
-                <a:latin typeface="PFDinTextCompPro-Italic"/>
-                <a:cs typeface="PFDinTextCompPro-Italic"/>
-              </a:rPr>
-              <a:t> = log(2)) indicates </a:t>
-            </a:r>
-            <a:r>
-              <a:rPr lang="en-US" sz="3000" dirty="0">
-                <a:latin typeface="PFDinTextCompPro-Italic"/>
-                <a:cs typeface="PFDinTextCompPro-Italic"/>
-              </a:rPr>
-              <a:t>that a purchase is twice as likely for an </a:t>
-            </a:r>
-            <a:r>
-              <a:rPr lang="en-US" sz="3000" dirty="0" err="1">
-                <a:latin typeface="PFDinTextCompPro-Italic"/>
-                <a:cs typeface="PFDinTextCompPro-Italic"/>
-              </a:rPr>
-              <a:t>iOS</a:t>
-            </a:r>
-            <a:r>
-              <a:rPr lang="en-US" sz="3000" dirty="0">
-                <a:latin typeface="PFDinTextCompPro-Italic"/>
-                <a:cs typeface="PFDinTextCompPro-Italic"/>
-              </a:rPr>
-              <a:t> user as for a non-</a:t>
-            </a:r>
-            <a:r>
-              <a:rPr lang="en-US" sz="3000" dirty="0" err="1">
-                <a:latin typeface="PFDinTextCompPro-Italic"/>
-                <a:cs typeface="PFDinTextCompPro-Italic"/>
-              </a:rPr>
-              <a:t>iOS</a:t>
-            </a:r>
-            <a:r>
-              <a:rPr lang="en-US" sz="3000" dirty="0">
-                <a:latin typeface="PFDinTextCompPro-Italic"/>
-                <a:cs typeface="PFDinTextCompPro-Italic"/>
-              </a:rPr>
-              <a:t> user.</a:t>
-            </a:r>
-          </a:p>
-          <a:p>
-            <a:pPr algn="l"/>
-            <a:endParaRPr lang="en-US" sz="3000" dirty="0" smtClean="0">
-              <a:latin typeface="PFDinTextCompPro-Italic"/>
-              <a:cs typeface="PFDinTextCompPro-Italic"/>
+            <a:pPr marL="0" indent="0"/>
+            <a:r>
+              <a:rPr lang="en-US" cap="none" dirty="0" smtClean="0">
+                <a:latin typeface="PFDinTextCompPro-Bold" charset="0"/>
+                <a:ea typeface="ヒラギノ角ゴ ProN W3" charset="0"/>
+                <a:cs typeface="ヒラギノ角ゴ ProN W3" charset="0"/>
+              </a:rPr>
+              <a:t>INTRO TO DATA SCIENCE</a:t>
+            </a:r>
+            <a:endParaRPr lang="en-US" cap="none" dirty="0">
+              <a:latin typeface="PFDinTextCompPro-Bold" charset="0"/>
+              <a:ea typeface="ヒラギノ角ゴ ProN W3" charset="0"/>
+              <a:cs typeface="ヒラギノ角ゴ ProN W3" charset="0"/>
             </a:endParaRPr>
           </a:p>
         </p:txBody>
@@ -23577,7 +23119,7 @@
     </p:spTree>
     <p:extLst>
       <p:ext uri="{BB962C8B-B14F-4D97-AF65-F5344CB8AC3E}">
-        <p14:creationId xmlns:p14="http://schemas.microsoft.com/office/powerpoint/2010/main" val="3491433904"/>
+        <p14:creationId xmlns:p14="http://schemas.microsoft.com/office/powerpoint/2010/main" val="2564836905"/>
       </p:ext>
     </p:extLst>
   </p:cSld>
@@ -23614,123 +23156,6 @@
       </p:grpSpPr>
       <p:sp>
         <p:nvSpPr>
-          <p:cNvPr id="2" name="Title 1"/>
-          <p:cNvSpPr>
-            <a:spLocks noGrp="1"/>
-          </p:cNvSpPr>
-          <p:nvPr>
-            <p:ph type="title"/>
-          </p:nvPr>
-        </p:nvSpPr>
-        <p:spPr>
-          <a:xfrm>
-            <a:off x="347663" y="3467100"/>
-            <a:ext cx="8426450" cy="1828800"/>
-          </a:xfrm>
-        </p:spPr>
-        <p:txBody>
-          <a:bodyPr/>
-          <a:lstStyle/>
-          <a:p>
-            <a:pPr>
-              <a:defRPr/>
-            </a:pPr>
-            <a:r>
-              <a:rPr lang="en-US" sz="7500" dirty="0" smtClean="0"/>
-              <a:t/>
-            </a:r>
-            <a:br>
-              <a:rPr lang="en-US" sz="7500" dirty="0" smtClean="0"/>
-            </a:br>
-            <a:r>
-              <a:rPr lang="en-US" sz="7500" dirty="0" smtClean="0"/>
-              <a:t>Ex: logistic regression</a:t>
-            </a:r>
-            <a:endParaRPr lang="en-US" sz="7500" dirty="0"/>
-          </a:p>
-        </p:txBody>
-      </p:sp>
-      <p:sp>
-        <p:nvSpPr>
-          <p:cNvPr id="4" name="Content Placeholder 3"/>
-          <p:cNvSpPr>
-            <a:spLocks noGrp="1"/>
-          </p:cNvSpPr>
-          <p:nvPr>
-            <p:ph sz="quarter" idx="11"/>
-          </p:nvPr>
-        </p:nvSpPr>
-        <p:spPr>
-          <a:xfrm>
-            <a:off x="371475" y="495300"/>
-            <a:ext cx="6400800" cy="304800"/>
-          </a:xfrm>
-        </p:spPr>
-        <p:txBody>
-          <a:bodyPr wrap="square" lIns="91440" tIns="45720" rIns="91440" bIns="45720" numCol="1" anchor="t" anchorCtr="0" compatLnSpc="1">
-            <a:prstTxWarp prst="textNoShape">
-              <a:avLst/>
-            </a:prstTxWarp>
-          </a:bodyPr>
-          <a:lstStyle/>
-          <a:p>
-            <a:pPr marL="0" indent="0"/>
-            <a:r>
-              <a:rPr lang="en-US" cap="none" dirty="0" smtClean="0">
-                <a:latin typeface="PFDinTextCompPro-Bold" charset="0"/>
-                <a:ea typeface="ヒラギノ角ゴ ProN W3" charset="0"/>
-                <a:cs typeface="ヒラギノ角ゴ ProN W3" charset="0"/>
-              </a:rPr>
-              <a:t>INTRO TO DATA SCIENCE</a:t>
-            </a:r>
-            <a:endParaRPr lang="en-US" cap="none" dirty="0">
-              <a:latin typeface="PFDinTextCompPro-Bold" charset="0"/>
-              <a:ea typeface="ヒラギノ角ゴ ProN W3" charset="0"/>
-              <a:cs typeface="ヒラギノ角ゴ ProN W3" charset="0"/>
-            </a:endParaRPr>
-          </a:p>
-        </p:txBody>
-      </p:sp>
-    </p:spTree>
-    <p:extLst>
-      <p:ext uri="{BB962C8B-B14F-4D97-AF65-F5344CB8AC3E}">
-        <p14:creationId xmlns:p14="http://schemas.microsoft.com/office/powerpoint/2010/main" val="2564836905"/>
-      </p:ext>
-    </p:extLst>
-  </p:cSld>
-  <p:clrMapOvr>
-    <a:masterClrMapping/>
-  </p:clrMapOvr>
-  <p:transition xmlns:p14="http://schemas.microsoft.com/office/powerpoint/2010/main"/>
-  <p:timing>
-    <p:tnLst>
-      <p:par>
-        <p:cTn xmlns:p14="http://schemas.microsoft.com/office/powerpoint/2010/main" id="1" dur="indefinite" restart="never" nodeType="tmRoot"/>
-      </p:par>
-    </p:tnLst>
-  </p:timing>
-</p:sld>
-</file>
-
-<file path=ppt/slides/slide53.xml><?xml version="1.0" encoding="utf-8"?>
-<p:sld xmlns:a="http://schemas.openxmlformats.org/drawingml/2006/main" xmlns:r="http://schemas.openxmlformats.org/officeDocument/2006/relationships" xmlns:p="http://schemas.openxmlformats.org/presentationml/2006/main">
-  <p:cSld>
-    <p:spTree>
-      <p:nvGrpSpPr>
-        <p:cNvPr id="1" name=""/>
-        <p:cNvGrpSpPr/>
-        <p:nvPr/>
-      </p:nvGrpSpPr>
-      <p:grpSpPr>
-        <a:xfrm>
-          <a:off x="0" y="0"/>
-          <a:ext cx="0" cy="0"/>
-          <a:chOff x="0" y="0"/>
-          <a:chExt cx="0" cy="0"/>
-        </a:xfrm>
-      </p:grpSpPr>
-      <p:sp>
-        <p:nvSpPr>
           <p:cNvPr id="4" name="Content Placeholder 3"/>
           <p:cNvSpPr>
             <a:spLocks noGrp="1"/>
@@ -23785,7 +23210,7 @@
               <a:pPr>
                 <a:defRPr/>
               </a:pPr>
-              <a:t>53</a:t>
+              <a:t>52</a:t>
             </a:fld>
             <a:endParaRPr lang="en-US"/>
           </a:p>

</xml_diff>

<commit_message>
fix odds ratio exp
</commit_message>
<xml_diff>
--- a/09-logistic/slides.pptx
+++ b/09-logistic/slides.pptx
@@ -22959,7 +22959,35 @@
                 <a:latin typeface="PFDinTextCompPro-Italic"/>
                 <a:cs typeface="PFDinTextCompPro-Italic"/>
               </a:rPr>
-              <a:t>that a purchase is twice as likely for an </a:t>
+              <a:t>that </a:t>
+            </a:r>
+            <a:r>
+              <a:rPr lang="en-US" sz="3000" dirty="0" smtClean="0">
+                <a:latin typeface="PFDinTextCompPro-Italic"/>
+                <a:cs typeface="PFDinTextCompPro-Italic"/>
+              </a:rPr>
+              <a:t>the odds of </a:t>
+            </a:r>
+            <a:r>
+              <a:rPr lang="en-US" sz="3000" dirty="0">
+                <a:latin typeface="PFDinTextCompPro-Italic"/>
+                <a:cs typeface="PFDinTextCompPro-Italic"/>
+              </a:rPr>
+              <a:t>purchase </a:t>
+            </a:r>
+            <a:r>
+              <a:rPr lang="en-US" sz="3000" dirty="0" smtClean="0">
+                <a:latin typeface="PFDinTextCompPro-Italic"/>
+                <a:cs typeface="PFDinTextCompPro-Italic"/>
+              </a:rPr>
+              <a:t>is twice as high </a:t>
+            </a:r>
+            <a:r>
+              <a:rPr lang="en-US" sz="3000" dirty="0">
+                <a:latin typeface="PFDinTextCompPro-Italic"/>
+                <a:cs typeface="PFDinTextCompPro-Italic"/>
+              </a:rPr>
+              <a:t>for an </a:t>
             </a:r>
             <a:r>
               <a:rPr lang="en-US" sz="3000" dirty="0" err="1">

</xml_diff>

<commit_message>
slides might be ready
</commit_message>
<xml_diff>
--- a/09-logistic/slides.pptx
+++ b/09-logistic/slides.pptx
@@ -6,7 +6,7 @@
     <p:sldMasterId id="2147483649" r:id="rId2"/>
   </p:sldMasterIdLst>
   <p:notesMasterIdLst>
-    <p:notesMasterId r:id="rId55"/>
+    <p:notesMasterId r:id="rId54"/>
   </p:notesMasterIdLst>
   <p:sldIdLst>
     <p:sldId id="258" r:id="rId3"/>
@@ -60,7 +60,6 @@
     <p:sldId id="711" r:id="rId51"/>
     <p:sldId id="712" r:id="rId52"/>
     <p:sldId id="504" r:id="rId53"/>
-    <p:sldId id="572" r:id="rId54"/>
   </p:sldIdLst>
   <p:sldSz cx="9363075" cy="5257800"/>
   <p:notesSz cx="6858000" cy="9144000"/>
@@ -5874,118 +5873,6 @@
     <p:extLst>
       <p:ext uri="{BB962C8B-B14F-4D97-AF65-F5344CB8AC3E}">
         <p14:creationId xmlns:p14="http://schemas.microsoft.com/office/powerpoint/2010/main" val="158773868"/>
-      </p:ext>
-    </p:extLst>
-  </p:cSld>
-  <p:clrMapOvr>
-    <a:masterClrMapping/>
-  </p:clrMapOvr>
-</p:notes>
-</file>
-
-<file path=ppt/notesSlides/notesSlide52.xml><?xml version="1.0" encoding="utf-8"?>
-<p:notes xmlns:a="http://schemas.openxmlformats.org/drawingml/2006/main" xmlns:r="http://schemas.openxmlformats.org/officeDocument/2006/relationships" xmlns:p="http://schemas.openxmlformats.org/presentationml/2006/main">
-  <p:cSld>
-    <p:spTree>
-      <p:nvGrpSpPr>
-        <p:cNvPr id="1" name=""/>
-        <p:cNvGrpSpPr/>
-        <p:nvPr/>
-      </p:nvGrpSpPr>
-      <p:grpSpPr>
-        <a:xfrm>
-          <a:off x="0" y="0"/>
-          <a:ext cx="0" cy="0"/>
-          <a:chOff x="0" y="0"/>
-          <a:chExt cx="0" cy="0"/>
-        </a:xfrm>
-      </p:grpSpPr>
-      <p:sp>
-        <p:nvSpPr>
-          <p:cNvPr id="2" name="Slide Image Placeholder 1"/>
-          <p:cNvSpPr>
-            <a:spLocks noGrp="1" noRot="1" noChangeAspect="1"/>
-          </p:cNvSpPr>
-          <p:nvPr>
-            <p:ph type="sldImg"/>
-          </p:nvPr>
-        </p:nvSpPr>
-        <p:spPr/>
-      </p:sp>
-      <p:sp>
-        <p:nvSpPr>
-          <p:cNvPr id="3" name="Notes Placeholder 2"/>
-          <p:cNvSpPr>
-            <a:spLocks noGrp="1"/>
-          </p:cNvSpPr>
-          <p:nvPr>
-            <p:ph type="body" idx="1"/>
-          </p:nvPr>
-        </p:nvSpPr>
-        <p:spPr/>
-        <p:txBody>
-          <a:bodyPr/>
-          <a:lstStyle/>
-          <a:p>
-            <a:r>
-              <a:rPr lang="en-US" baseline="0" dirty="0" smtClean="0"/>
-              <a:t>Note: results only show in-sample performance!</a:t>
-            </a:r>
-          </a:p>
-          <a:p>
-            <a:pPr marL="0" marR="0" indent="0" algn="l" defTabSz="457200" rtl="0" eaLnBrk="1" fontAlgn="auto" latinLnBrk="0" hangingPunct="1">
-              <a:lnSpc>
-                <a:spcPct val="100000"/>
-              </a:lnSpc>
-              <a:spcBef>
-                <a:spcPts val="0"/>
-              </a:spcBef>
-              <a:spcAft>
-                <a:spcPts val="0"/>
-              </a:spcAft>
-              <a:buClrTx/>
-              <a:buSzTx/>
-              <a:buFontTx/>
-              <a:buNone/>
-              <a:tabLst/>
-              <a:defRPr/>
-            </a:pPr>
-            <a:endParaRPr lang="en-US" sz="1200" baseline="0" dirty="0" smtClean="0">
-              <a:solidFill>
-                <a:prstClr val="black"/>
-              </a:solidFill>
-              <a:latin typeface="ArialMT"/>
-            </a:endParaRPr>
-          </a:p>
-        </p:txBody>
-      </p:sp>
-      <p:sp>
-        <p:nvSpPr>
-          <p:cNvPr id="4" name="Slide Number Placeholder 3"/>
-          <p:cNvSpPr>
-            <a:spLocks noGrp="1"/>
-          </p:cNvSpPr>
-          <p:nvPr>
-            <p:ph type="sldNum" sz="quarter" idx="10"/>
-          </p:nvPr>
-        </p:nvSpPr>
-        <p:spPr/>
-        <p:txBody>
-          <a:bodyPr/>
-          <a:lstStyle/>
-          <a:p>
-            <a:fld id="{ADD4B5B7-85EF-4E48-AC80-2380FACD9C23}" type="slidenum">
-              <a:rPr lang="en-US" smtClean="0"/>
-              <a:t>52</a:t>
-            </a:fld>
-            <a:endParaRPr lang="en-US"/>
-          </a:p>
-        </p:txBody>
-      </p:sp>
-    </p:spTree>
-    <p:extLst>
-      <p:ext uri="{BB962C8B-B14F-4D97-AF65-F5344CB8AC3E}">
-        <p14:creationId xmlns:p14="http://schemas.microsoft.com/office/powerpoint/2010/main" val="645762702"/>
       </p:ext>
     </p:extLst>
   </p:cSld>
@@ -23077,8 +22964,8 @@
         </p:nvSpPr>
         <p:spPr>
           <a:xfrm>
-            <a:off x="347663" y="3467100"/>
-            <a:ext cx="8426450" cy="1828800"/>
+            <a:off x="347663" y="3695700"/>
+            <a:ext cx="8426450" cy="1600200"/>
           </a:xfrm>
         </p:spPr>
         <p:txBody>
@@ -23090,14 +22977,7 @@
             </a:pPr>
             <a:r>
               <a:rPr lang="en-US" sz="7500" dirty="0" smtClean="0"/>
-              <a:t/>
-            </a:r>
-            <a:br>
-              <a:rPr lang="en-US" sz="7500" dirty="0" smtClean="0"/>
-            </a:br>
-            <a:r>
-              <a:rPr lang="en-US" sz="7500" dirty="0" smtClean="0"/>
-              <a:t>Ex: logistic regression</a:t>
+              <a:t>Exercise</a:t>
             </a:r>
             <a:endParaRPr lang="en-US" sz="7500" dirty="0"/>
           </a:p>
@@ -23148,776 +23028,6 @@
     <p:extLst>
       <p:ext uri="{BB962C8B-B14F-4D97-AF65-F5344CB8AC3E}">
         <p14:creationId xmlns:p14="http://schemas.microsoft.com/office/powerpoint/2010/main" val="2564836905"/>
-      </p:ext>
-    </p:extLst>
-  </p:cSld>
-  <p:clrMapOvr>
-    <a:masterClrMapping/>
-  </p:clrMapOvr>
-  <p:transition xmlns:p14="http://schemas.microsoft.com/office/powerpoint/2010/main"/>
-  <p:timing>
-    <p:tnLst>
-      <p:par>
-        <p:cTn xmlns:p14="http://schemas.microsoft.com/office/powerpoint/2010/main" id="1" dur="indefinite" restart="never" nodeType="tmRoot"/>
-      </p:par>
-    </p:tnLst>
-  </p:timing>
-</p:sld>
-</file>
-
-<file path=ppt/slides/slide52.xml><?xml version="1.0" encoding="utf-8"?>
-<p:sld xmlns:a="http://schemas.openxmlformats.org/drawingml/2006/main" xmlns:r="http://schemas.openxmlformats.org/officeDocument/2006/relationships" xmlns:p="http://schemas.openxmlformats.org/presentationml/2006/main">
-  <p:cSld>
-    <p:spTree>
-      <p:nvGrpSpPr>
-        <p:cNvPr id="1" name=""/>
-        <p:cNvGrpSpPr/>
-        <p:nvPr/>
-      </p:nvGrpSpPr>
-      <p:grpSpPr>
-        <a:xfrm>
-          <a:off x="0" y="0"/>
-          <a:ext cx="0" cy="0"/>
-          <a:chOff x="0" y="0"/>
-          <a:chExt cx="0" cy="0"/>
-        </a:xfrm>
-      </p:grpSpPr>
-      <p:sp>
-        <p:nvSpPr>
-          <p:cNvPr id="4" name="Content Placeholder 3"/>
-          <p:cNvSpPr>
-            <a:spLocks noGrp="1"/>
-          </p:cNvSpPr>
-          <p:nvPr>
-            <p:ph sz="quarter" idx="11"/>
-          </p:nvPr>
-        </p:nvSpPr>
-        <p:spPr>
-          <a:xfrm>
-            <a:off x="414337" y="495300"/>
-            <a:ext cx="7162800" cy="304800"/>
-          </a:xfrm>
-        </p:spPr>
-        <p:txBody>
-          <a:bodyPr/>
-          <a:lstStyle/>
-          <a:p>
-            <a:pPr eaLnBrk="1" hangingPunct="1">
-              <a:lnSpc>
-                <a:spcPts val="2448"/>
-              </a:lnSpc>
-              <a:defRPr/>
-            </a:pPr>
-            <a:r>
-              <a:rPr lang="en-US" dirty="0" smtClean="0"/>
-              <a:t>Exercise 1 – linear regression</a:t>
-            </a:r>
-          </a:p>
-        </p:txBody>
-      </p:sp>
-      <p:sp>
-        <p:nvSpPr>
-          <p:cNvPr id="8" name="Slide Number Placeholder 3"/>
-          <p:cNvSpPr>
-            <a:spLocks noGrp="1"/>
-          </p:cNvSpPr>
-          <p:nvPr>
-            <p:ph type="sldNum" sz="quarter" idx="13"/>
-          </p:nvPr>
-        </p:nvSpPr>
-        <p:spPr/>
-        <p:txBody>
-          <a:bodyPr/>
-          <a:lstStyle/>
-          <a:p>
-            <a:pPr>
-              <a:defRPr/>
-            </a:pPr>
-            <a:fld id="{BD5AD749-DAD1-6A4A-A2AA-CB20EAD0AEB7}" type="slidenum">
-              <a:rPr lang="en-US"/>
-              <a:pPr>
-                <a:defRPr/>
-              </a:pPr>
-              <a:t>52</a:t>
-            </a:fld>
-            <a:endParaRPr lang="en-US"/>
-          </a:p>
-        </p:txBody>
-      </p:sp>
-      <p:sp>
-        <p:nvSpPr>
-          <p:cNvPr id="17" name="Text Placeholder 11"/>
-          <p:cNvSpPr txBox="1">
-            <a:spLocks/>
-          </p:cNvSpPr>
-          <p:nvPr/>
-        </p:nvSpPr>
-        <p:spPr>
-          <a:xfrm>
-            <a:off x="719137" y="1181100"/>
-            <a:ext cx="2689225" cy="490538"/>
-          </a:xfrm>
-          <a:prstGeom prst="rect">
-            <a:avLst/>
-          </a:prstGeom>
-        </p:spPr>
-        <p:txBody>
-          <a:bodyPr vert="horz" lIns="0" tIns="32914" rIns="65828" bIns="32914"/>
-          <a:lstStyle>
-            <a:lvl1pPr marL="174625" indent="-174625" algn="l" rtl="0" eaLnBrk="0" fontAlgn="base" hangingPunct="0">
-              <a:lnSpc>
-                <a:spcPts val="2450"/>
-              </a:lnSpc>
-              <a:spcBef>
-                <a:spcPct val="0"/>
-              </a:spcBef>
-              <a:spcAft>
-                <a:spcPct val="0"/>
-              </a:spcAft>
-              <a:buSzPct val="69000"/>
-              <a:buFont typeface="Lucida Grande"/>
-              <a:buChar char="‣"/>
-              <a:defRPr sz="2000" baseline="0">
-                <a:solidFill>
-                  <a:schemeClr val="tx1"/>
-                </a:solidFill>
-                <a:latin typeface="+mn-lt"/>
-                <a:ea typeface="+mn-ea"/>
-                <a:cs typeface="+mn-cs"/>
-                <a:sym typeface="News706 BT" charset="0"/>
-              </a:defRPr>
-            </a:lvl1pPr>
-            <a:lvl2pPr marL="329138" indent="0" algn="ctr" rtl="0" eaLnBrk="0" fontAlgn="base" hangingPunct="0">
-              <a:lnSpc>
-                <a:spcPts val="2450"/>
-              </a:lnSpc>
-              <a:spcBef>
-                <a:spcPct val="0"/>
-              </a:spcBef>
-              <a:spcAft>
-                <a:spcPct val="0"/>
-              </a:spcAft>
-              <a:buSzPct val="69000"/>
-              <a:buFont typeface="Lucida Grande" charset="0"/>
-              <a:buNone/>
-              <a:defRPr sz="2000">
-                <a:solidFill>
-                  <a:schemeClr val="tx1"/>
-                </a:solidFill>
-                <a:latin typeface="+mn-lt"/>
-                <a:ea typeface="+mn-ea"/>
-                <a:cs typeface="+mn-cs"/>
-                <a:sym typeface="News706 BT" charset="0"/>
-              </a:defRPr>
-            </a:lvl2pPr>
-            <a:lvl3pPr marL="658277" indent="0" algn="ctr" rtl="0" eaLnBrk="0" fontAlgn="base" hangingPunct="0">
-              <a:lnSpc>
-                <a:spcPts val="2450"/>
-              </a:lnSpc>
-              <a:spcBef>
-                <a:spcPct val="0"/>
-              </a:spcBef>
-              <a:spcAft>
-                <a:spcPct val="0"/>
-              </a:spcAft>
-              <a:buSzPct val="69000"/>
-              <a:buFont typeface="Lucida Grande" charset="0"/>
-              <a:buNone/>
-              <a:defRPr sz="2000">
-                <a:solidFill>
-                  <a:schemeClr val="tx1"/>
-                </a:solidFill>
-                <a:latin typeface="+mn-lt"/>
-                <a:ea typeface="+mn-ea"/>
-                <a:cs typeface="+mn-cs"/>
-                <a:sym typeface="News706 BT" charset="0"/>
-              </a:defRPr>
-            </a:lvl3pPr>
-            <a:lvl4pPr marL="987415" indent="0" algn="ctr" rtl="0" eaLnBrk="0" fontAlgn="base" hangingPunct="0">
-              <a:lnSpc>
-                <a:spcPts val="2450"/>
-              </a:lnSpc>
-              <a:spcBef>
-                <a:spcPct val="0"/>
-              </a:spcBef>
-              <a:spcAft>
-                <a:spcPct val="0"/>
-              </a:spcAft>
-              <a:buSzPct val="69000"/>
-              <a:buFont typeface="Lucida Grande" charset="0"/>
-              <a:buNone/>
-              <a:defRPr sz="2000">
-                <a:solidFill>
-                  <a:schemeClr val="tx1"/>
-                </a:solidFill>
-                <a:latin typeface="+mn-lt"/>
-                <a:ea typeface="+mn-ea"/>
-                <a:cs typeface="+mn-cs"/>
-                <a:sym typeface="News706 BT" charset="0"/>
-              </a:defRPr>
-            </a:lvl4pPr>
-            <a:lvl5pPr marL="1316553" indent="0" algn="ctr" rtl="0" eaLnBrk="0" fontAlgn="base" hangingPunct="0">
-              <a:lnSpc>
-                <a:spcPts val="2450"/>
-              </a:lnSpc>
-              <a:spcBef>
-                <a:spcPct val="0"/>
-              </a:spcBef>
-              <a:spcAft>
-                <a:spcPct val="0"/>
-              </a:spcAft>
-              <a:buSzPct val="69000"/>
-              <a:buFont typeface="Lucida Grande" charset="0"/>
-              <a:buNone/>
-              <a:defRPr sz="2000">
-                <a:solidFill>
-                  <a:schemeClr val="tx1"/>
-                </a:solidFill>
-                <a:latin typeface="+mn-lt"/>
-                <a:ea typeface="+mn-ea"/>
-                <a:cs typeface="+mn-cs"/>
-                <a:sym typeface="News706 BT" charset="0"/>
-              </a:defRPr>
-            </a:lvl5pPr>
-            <a:lvl6pPr marL="1645691" indent="0" algn="ctr" rtl="0" fontAlgn="base">
-              <a:lnSpc>
-                <a:spcPts val="2448"/>
-              </a:lnSpc>
-              <a:spcBef>
-                <a:spcPct val="0"/>
-              </a:spcBef>
-              <a:spcAft>
-                <a:spcPct val="0"/>
-              </a:spcAft>
-              <a:buSzPct val="69000"/>
-              <a:buFont typeface="Lucida Grande" charset="0"/>
-              <a:buNone/>
-              <a:defRPr sz="2000">
-                <a:solidFill>
-                  <a:schemeClr val="tx1"/>
-                </a:solidFill>
-                <a:latin typeface="+mn-lt"/>
-                <a:ea typeface="+mn-ea"/>
-                <a:cs typeface="+mn-cs"/>
-                <a:sym typeface="News706 BT" charset="0"/>
-              </a:defRPr>
-            </a:lvl6pPr>
-            <a:lvl7pPr marL="1974830" indent="0" algn="ctr" rtl="0" fontAlgn="base">
-              <a:lnSpc>
-                <a:spcPts val="2448"/>
-              </a:lnSpc>
-              <a:spcBef>
-                <a:spcPct val="0"/>
-              </a:spcBef>
-              <a:spcAft>
-                <a:spcPct val="0"/>
-              </a:spcAft>
-              <a:buSzPct val="69000"/>
-              <a:buFont typeface="Lucida Grande" charset="0"/>
-              <a:buNone/>
-              <a:defRPr sz="2000">
-                <a:solidFill>
-                  <a:schemeClr val="tx1"/>
-                </a:solidFill>
-                <a:latin typeface="+mn-lt"/>
-                <a:ea typeface="+mn-ea"/>
-                <a:cs typeface="+mn-cs"/>
-                <a:sym typeface="News706 BT" charset="0"/>
-              </a:defRPr>
-            </a:lvl7pPr>
-            <a:lvl8pPr marL="2303968" indent="0" algn="ctr" rtl="0" fontAlgn="base">
-              <a:lnSpc>
-                <a:spcPts val="2448"/>
-              </a:lnSpc>
-              <a:spcBef>
-                <a:spcPct val="0"/>
-              </a:spcBef>
-              <a:spcAft>
-                <a:spcPct val="0"/>
-              </a:spcAft>
-              <a:buSzPct val="69000"/>
-              <a:buFont typeface="Lucida Grande" charset="0"/>
-              <a:buNone/>
-              <a:defRPr sz="2000">
-                <a:solidFill>
-                  <a:schemeClr val="tx1"/>
-                </a:solidFill>
-                <a:latin typeface="+mn-lt"/>
-                <a:ea typeface="+mn-ea"/>
-                <a:cs typeface="+mn-cs"/>
-                <a:sym typeface="News706 BT" charset="0"/>
-              </a:defRPr>
-            </a:lvl8pPr>
-            <a:lvl9pPr marL="2633106" indent="0" algn="ctr" rtl="0" fontAlgn="base">
-              <a:lnSpc>
-                <a:spcPts val="2448"/>
-              </a:lnSpc>
-              <a:spcBef>
-                <a:spcPct val="0"/>
-              </a:spcBef>
-              <a:spcAft>
-                <a:spcPct val="0"/>
-              </a:spcAft>
-              <a:buSzPct val="69000"/>
-              <a:buFont typeface="Lucida Grande" charset="0"/>
-              <a:buNone/>
-              <a:defRPr sz="2000">
-                <a:solidFill>
-                  <a:schemeClr val="tx1"/>
-                </a:solidFill>
-                <a:latin typeface="+mn-lt"/>
-                <a:ea typeface="+mn-ea"/>
-                <a:cs typeface="+mn-cs"/>
-                <a:sym typeface="News706 BT" charset="0"/>
-              </a:defRPr>
-            </a:lvl9pPr>
-          </a:lstStyle>
-          <a:p>
-            <a:pPr marL="0" indent="0">
-              <a:buNone/>
-              <a:defRPr/>
-            </a:pPr>
-            <a:r>
-              <a:rPr lang="en-US" sz="1400" b="1" cap="all" dirty="0" smtClean="0">
-                <a:latin typeface="PFDinTextCompPro-Bold"/>
-                <a:cs typeface="PFDinTextCompPro-Bold"/>
-              </a:rPr>
-              <a:t>Key objectives</a:t>
-            </a:r>
-            <a:endParaRPr lang="en-US" sz="1400" b="1" cap="all" dirty="0">
-              <a:latin typeface="PFDinTextCompPro-Bold"/>
-              <a:cs typeface="PFDinTextCompPro-Bold"/>
-            </a:endParaRPr>
-          </a:p>
-        </p:txBody>
-      </p:sp>
-      <p:sp>
-        <p:nvSpPr>
-          <p:cNvPr id="18" name="Content Placeholder 12"/>
-          <p:cNvSpPr>
-            <a:spLocks noGrp="1"/>
-          </p:cNvSpPr>
-          <p:nvPr>
-            <p:ph sz="half" idx="4294967295"/>
-          </p:nvPr>
-        </p:nvSpPr>
-        <p:spPr bwMode="auto">
-          <a:xfrm>
-            <a:off x="490537" y="1771650"/>
-            <a:ext cx="8077200" cy="2838450"/>
-          </a:xfrm>
-          <a:prstGeom prst="rect">
-            <a:avLst/>
-          </a:prstGeom>
-          <a:noFill/>
-          <a:extLst>
-            <a:ext uri="{909E8E84-426E-40dd-AFC4-6F175D3DCCD1}">
-              <a14:hiddenFill xmlns:a14="http://schemas.microsoft.com/office/drawing/2010/main">
-                <a:solidFill>
-                  <a:srgbClr val="FFFFFF"/>
-                </a:solidFill>
-              </a14:hiddenFill>
-            </a:ext>
-            <a:ext uri="{91240B29-F687-4f45-9708-019B960494DF}">
-              <a14:hiddenLine xmlns:a14="http://schemas.microsoft.com/office/drawing/2010/main" w="9525">
-                <a:solidFill>
-                  <a:srgbClr val="000000"/>
-                </a:solidFill>
-                <a:miter lim="800000"/>
-                <a:headEnd/>
-                <a:tailEnd/>
-              </a14:hiddenLine>
-            </a:ext>
-          </a:extLst>
-        </p:spPr>
-        <p:txBody>
-          <a:bodyPr wrap="square" numCol="1" anchor="t" anchorCtr="0" compatLnSpc="1">
-            <a:prstTxWarp prst="textNoShape">
-              <a:avLst/>
-            </a:prstTxWarp>
-          </a:bodyPr>
-          <a:lstStyle/>
-          <a:p>
-            <a:pPr marL="0" indent="0">
-              <a:buNone/>
-            </a:pPr>
-            <a:r>
-              <a:rPr lang="en-US" sz="2300" dirty="0" smtClean="0">
-                <a:latin typeface="PFDinTextCompPro-Italic"/>
-                <a:ea typeface="ヒラギノ角ゴ ProN W3" charset="0"/>
-                <a:cs typeface="PFDinTextCompPro-Italic"/>
-              </a:rPr>
-              <a:t>- perform a logistic fit			- </a:t>
-            </a:r>
-            <a:r>
-              <a:rPr lang="en-US" sz="2300" dirty="0" err="1" smtClean="0">
-                <a:latin typeface="PFDinTextCompPro-Italic"/>
-                <a:ea typeface="ヒラギノ角ゴ ProN W3" charset="0"/>
-                <a:cs typeface="PFDinTextCompPro-Italic"/>
-              </a:rPr>
-              <a:t>glm</a:t>
-            </a:r>
-            <a:r>
-              <a:rPr lang="en-US" sz="2300" dirty="0" smtClean="0">
-                <a:latin typeface="PFDinTextCompPro-Italic"/>
-                <a:ea typeface="ヒラギノ角ゴ ProN W3" charset="0"/>
-                <a:cs typeface="PFDinTextCompPro-Italic"/>
-              </a:rPr>
-              <a:t> {stat}</a:t>
-            </a:r>
-            <a:endParaRPr lang="en-US" sz="2300" dirty="0">
-              <a:latin typeface="PFDinTextCompPro-Italic"/>
-              <a:ea typeface="ヒラギノ角ゴ ProN W3" charset="0"/>
-              <a:cs typeface="PFDinTextCompPro-Italic"/>
-            </a:endParaRPr>
-          </a:p>
-          <a:p>
-            <a:pPr marL="0" indent="0">
-              <a:buNone/>
-            </a:pPr>
-            <a:endParaRPr lang="en-US" sz="2300" dirty="0" smtClean="0">
-              <a:latin typeface="PFDinTextCompPro-Italic"/>
-              <a:ea typeface="ヒラギノ角ゴ ProN W3" charset="0"/>
-              <a:cs typeface="PFDinTextCompPro-Italic"/>
-            </a:endParaRPr>
-          </a:p>
-        </p:txBody>
-      </p:sp>
-      <p:sp>
-        <p:nvSpPr>
-          <p:cNvPr id="21" name="Text Placeholder 11"/>
-          <p:cNvSpPr txBox="1">
-            <a:spLocks/>
-          </p:cNvSpPr>
-          <p:nvPr/>
-        </p:nvSpPr>
-        <p:spPr>
-          <a:xfrm>
-            <a:off x="5138737" y="1181100"/>
-            <a:ext cx="2689225" cy="490538"/>
-          </a:xfrm>
-          <a:prstGeom prst="rect">
-            <a:avLst/>
-          </a:prstGeom>
-        </p:spPr>
-        <p:txBody>
-          <a:bodyPr vert="horz" lIns="0" tIns="32914" rIns="65828" bIns="32914"/>
-          <a:lstStyle>
-            <a:lvl1pPr marL="174625" indent="-174625" algn="l" rtl="0" eaLnBrk="0" fontAlgn="base" hangingPunct="0">
-              <a:lnSpc>
-                <a:spcPts val="2450"/>
-              </a:lnSpc>
-              <a:spcBef>
-                <a:spcPct val="0"/>
-              </a:spcBef>
-              <a:spcAft>
-                <a:spcPct val="0"/>
-              </a:spcAft>
-              <a:buSzPct val="69000"/>
-              <a:buFont typeface="Lucida Grande"/>
-              <a:buChar char="‣"/>
-              <a:defRPr sz="2000" baseline="0">
-                <a:solidFill>
-                  <a:schemeClr val="tx1"/>
-                </a:solidFill>
-                <a:latin typeface="+mn-lt"/>
-                <a:ea typeface="+mn-ea"/>
-                <a:cs typeface="+mn-cs"/>
-                <a:sym typeface="News706 BT" charset="0"/>
-              </a:defRPr>
-            </a:lvl1pPr>
-            <a:lvl2pPr marL="329138" indent="0" algn="ctr" rtl="0" eaLnBrk="0" fontAlgn="base" hangingPunct="0">
-              <a:lnSpc>
-                <a:spcPts val="2450"/>
-              </a:lnSpc>
-              <a:spcBef>
-                <a:spcPct val="0"/>
-              </a:spcBef>
-              <a:spcAft>
-                <a:spcPct val="0"/>
-              </a:spcAft>
-              <a:buSzPct val="69000"/>
-              <a:buFont typeface="Lucida Grande" charset="0"/>
-              <a:buNone/>
-              <a:defRPr sz="2000">
-                <a:solidFill>
-                  <a:schemeClr val="tx1"/>
-                </a:solidFill>
-                <a:latin typeface="+mn-lt"/>
-                <a:ea typeface="+mn-ea"/>
-                <a:cs typeface="+mn-cs"/>
-                <a:sym typeface="News706 BT" charset="0"/>
-              </a:defRPr>
-            </a:lvl2pPr>
-            <a:lvl3pPr marL="658277" indent="0" algn="ctr" rtl="0" eaLnBrk="0" fontAlgn="base" hangingPunct="0">
-              <a:lnSpc>
-                <a:spcPts val="2450"/>
-              </a:lnSpc>
-              <a:spcBef>
-                <a:spcPct val="0"/>
-              </a:spcBef>
-              <a:spcAft>
-                <a:spcPct val="0"/>
-              </a:spcAft>
-              <a:buSzPct val="69000"/>
-              <a:buFont typeface="Lucida Grande" charset="0"/>
-              <a:buNone/>
-              <a:defRPr sz="2000">
-                <a:solidFill>
-                  <a:schemeClr val="tx1"/>
-                </a:solidFill>
-                <a:latin typeface="+mn-lt"/>
-                <a:ea typeface="+mn-ea"/>
-                <a:cs typeface="+mn-cs"/>
-                <a:sym typeface="News706 BT" charset="0"/>
-              </a:defRPr>
-            </a:lvl3pPr>
-            <a:lvl4pPr marL="987415" indent="0" algn="ctr" rtl="0" eaLnBrk="0" fontAlgn="base" hangingPunct="0">
-              <a:lnSpc>
-                <a:spcPts val="2450"/>
-              </a:lnSpc>
-              <a:spcBef>
-                <a:spcPct val="0"/>
-              </a:spcBef>
-              <a:spcAft>
-                <a:spcPct val="0"/>
-              </a:spcAft>
-              <a:buSzPct val="69000"/>
-              <a:buFont typeface="Lucida Grande" charset="0"/>
-              <a:buNone/>
-              <a:defRPr sz="2000">
-                <a:solidFill>
-                  <a:schemeClr val="tx1"/>
-                </a:solidFill>
-                <a:latin typeface="+mn-lt"/>
-                <a:ea typeface="+mn-ea"/>
-                <a:cs typeface="+mn-cs"/>
-                <a:sym typeface="News706 BT" charset="0"/>
-              </a:defRPr>
-            </a:lvl4pPr>
-            <a:lvl5pPr marL="1316553" indent="0" algn="ctr" rtl="0" eaLnBrk="0" fontAlgn="base" hangingPunct="0">
-              <a:lnSpc>
-                <a:spcPts val="2450"/>
-              </a:lnSpc>
-              <a:spcBef>
-                <a:spcPct val="0"/>
-              </a:spcBef>
-              <a:spcAft>
-                <a:spcPct val="0"/>
-              </a:spcAft>
-              <a:buSzPct val="69000"/>
-              <a:buFont typeface="Lucida Grande" charset="0"/>
-              <a:buNone/>
-              <a:defRPr sz="2000">
-                <a:solidFill>
-                  <a:schemeClr val="tx1"/>
-                </a:solidFill>
-                <a:latin typeface="+mn-lt"/>
-                <a:ea typeface="+mn-ea"/>
-                <a:cs typeface="+mn-cs"/>
-                <a:sym typeface="News706 BT" charset="0"/>
-              </a:defRPr>
-            </a:lvl5pPr>
-            <a:lvl6pPr marL="1645691" indent="0" algn="ctr" rtl="0" fontAlgn="base">
-              <a:lnSpc>
-                <a:spcPts val="2448"/>
-              </a:lnSpc>
-              <a:spcBef>
-                <a:spcPct val="0"/>
-              </a:spcBef>
-              <a:spcAft>
-                <a:spcPct val="0"/>
-              </a:spcAft>
-              <a:buSzPct val="69000"/>
-              <a:buFont typeface="Lucida Grande" charset="0"/>
-              <a:buNone/>
-              <a:defRPr sz="2000">
-                <a:solidFill>
-                  <a:schemeClr val="tx1"/>
-                </a:solidFill>
-                <a:latin typeface="+mn-lt"/>
-                <a:ea typeface="+mn-ea"/>
-                <a:cs typeface="+mn-cs"/>
-                <a:sym typeface="News706 BT" charset="0"/>
-              </a:defRPr>
-            </a:lvl6pPr>
-            <a:lvl7pPr marL="1974830" indent="0" algn="ctr" rtl="0" fontAlgn="base">
-              <a:lnSpc>
-                <a:spcPts val="2448"/>
-              </a:lnSpc>
-              <a:spcBef>
-                <a:spcPct val="0"/>
-              </a:spcBef>
-              <a:spcAft>
-                <a:spcPct val="0"/>
-              </a:spcAft>
-              <a:buSzPct val="69000"/>
-              <a:buFont typeface="Lucida Grande" charset="0"/>
-              <a:buNone/>
-              <a:defRPr sz="2000">
-                <a:solidFill>
-                  <a:schemeClr val="tx1"/>
-                </a:solidFill>
-                <a:latin typeface="+mn-lt"/>
-                <a:ea typeface="+mn-ea"/>
-                <a:cs typeface="+mn-cs"/>
-                <a:sym typeface="News706 BT" charset="0"/>
-              </a:defRPr>
-            </a:lvl7pPr>
-            <a:lvl8pPr marL="2303968" indent="0" algn="ctr" rtl="0" fontAlgn="base">
-              <a:lnSpc>
-                <a:spcPts val="2448"/>
-              </a:lnSpc>
-              <a:spcBef>
-                <a:spcPct val="0"/>
-              </a:spcBef>
-              <a:spcAft>
-                <a:spcPct val="0"/>
-              </a:spcAft>
-              <a:buSzPct val="69000"/>
-              <a:buFont typeface="Lucida Grande" charset="0"/>
-              <a:buNone/>
-              <a:defRPr sz="2000">
-                <a:solidFill>
-                  <a:schemeClr val="tx1"/>
-                </a:solidFill>
-                <a:latin typeface="+mn-lt"/>
-                <a:ea typeface="+mn-ea"/>
-                <a:cs typeface="+mn-cs"/>
-                <a:sym typeface="News706 BT" charset="0"/>
-              </a:defRPr>
-            </a:lvl8pPr>
-            <a:lvl9pPr marL="2633106" indent="0" algn="ctr" rtl="0" fontAlgn="base">
-              <a:lnSpc>
-                <a:spcPts val="2448"/>
-              </a:lnSpc>
-              <a:spcBef>
-                <a:spcPct val="0"/>
-              </a:spcBef>
-              <a:spcAft>
-                <a:spcPct val="0"/>
-              </a:spcAft>
-              <a:buSzPct val="69000"/>
-              <a:buFont typeface="Lucida Grande" charset="0"/>
-              <a:buNone/>
-              <a:defRPr sz="2000">
-                <a:solidFill>
-                  <a:schemeClr val="tx1"/>
-                </a:solidFill>
-                <a:latin typeface="+mn-lt"/>
-                <a:ea typeface="+mn-ea"/>
-                <a:cs typeface="+mn-cs"/>
-                <a:sym typeface="News706 BT" charset="0"/>
-              </a:defRPr>
-            </a:lvl9pPr>
-          </a:lstStyle>
-          <a:p>
-            <a:pPr marL="0" indent="0">
-              <a:buNone/>
-              <a:defRPr/>
-            </a:pPr>
-            <a:r>
-              <a:rPr lang="en-US" sz="1400" b="1" cap="all" dirty="0" smtClean="0">
-                <a:latin typeface="PFDinTextCompPro-Bold"/>
-                <a:cs typeface="PFDinTextCompPro-Bold"/>
-              </a:rPr>
-              <a:t>tools</a:t>
-            </a:r>
-            <a:endParaRPr lang="en-US" sz="1400" b="1" cap="all" dirty="0">
-              <a:latin typeface="PFDinTextCompPro-Bold"/>
-              <a:cs typeface="PFDinTextCompPro-Bold"/>
-            </a:endParaRPr>
-          </a:p>
-        </p:txBody>
-      </p:sp>
-      <p:cxnSp>
-        <p:nvCxnSpPr>
-          <p:cNvPr id="29" name="Straight Connector 28"/>
-          <p:cNvCxnSpPr/>
-          <p:nvPr/>
-        </p:nvCxnSpPr>
-        <p:spPr bwMode="auto">
-          <a:xfrm>
-            <a:off x="566737" y="1638300"/>
-            <a:ext cx="3505200" cy="0"/>
-          </a:xfrm>
-          <a:prstGeom prst="line">
-            <a:avLst/>
-          </a:prstGeom>
-          <a:solidFill>
-            <a:schemeClr val="accent1"/>
-          </a:solidFill>
-          <a:ln w="12700" cap="flat" cmpd="sng" algn="ctr">
-            <a:solidFill>
-              <a:srgbClr val="000000"/>
-            </a:solidFill>
-            <a:prstDash val="solid"/>
-            <a:round/>
-            <a:headEnd type="none" w="med" len="med"/>
-            <a:tailEnd type="none" w="med" len="med"/>
-          </a:ln>
-          <a:effectLst/>
-          <a:extLst>
-            <a:ext uri="{AF507438-7753-43e0-B8FC-AC1667EBCBE1}">
-              <a14:hiddenEffects xmlns:a14="http://schemas.microsoft.com/office/drawing/2010/main">
-                <a:effectLst>
-                  <a:outerShdw blurRad="63500" dist="38099" dir="2700000" algn="ctr" rotWithShape="0">
-                    <a:schemeClr val="bg2">
-                      <a:alpha val="74998"/>
-                    </a:schemeClr>
-                  </a:outerShdw>
-                </a:effectLst>
-              </a14:hiddenEffects>
-            </a:ext>
-          </a:extLst>
-        </p:spPr>
-      </p:cxnSp>
-      <p:cxnSp>
-        <p:nvCxnSpPr>
-          <p:cNvPr id="31" name="Straight Connector 30"/>
-          <p:cNvCxnSpPr/>
-          <p:nvPr/>
-        </p:nvCxnSpPr>
-        <p:spPr bwMode="auto">
-          <a:xfrm>
-            <a:off x="5062537" y="1638300"/>
-            <a:ext cx="3810000" cy="0"/>
-          </a:xfrm>
-          <a:prstGeom prst="line">
-            <a:avLst/>
-          </a:prstGeom>
-          <a:solidFill>
-            <a:schemeClr val="accent1"/>
-          </a:solidFill>
-          <a:ln w="12700" cap="flat" cmpd="sng" algn="ctr">
-            <a:solidFill>
-              <a:srgbClr val="000000"/>
-            </a:solidFill>
-            <a:prstDash val="solid"/>
-            <a:round/>
-            <a:headEnd type="none" w="med" len="med"/>
-            <a:tailEnd type="none" w="med" len="med"/>
-          </a:ln>
-          <a:effectLst/>
-          <a:extLst>
-            <a:ext uri="{AF507438-7753-43e0-B8FC-AC1667EBCBE1}">
-              <a14:hiddenEffects xmlns:a14="http://schemas.microsoft.com/office/drawing/2010/main">
-                <a:effectLst>
-                  <a:outerShdw blurRad="63500" dist="38099" dir="2700000" algn="ctr" rotWithShape="0">
-                    <a:schemeClr val="bg2">
-                      <a:alpha val="74998"/>
-                    </a:schemeClr>
-                  </a:outerShdw>
-                </a:effectLst>
-              </a14:hiddenEffects>
-            </a:ext>
-          </a:extLst>
-        </p:spPr>
-      </p:cxnSp>
-    </p:spTree>
-    <p:extLst>
-      <p:ext uri="{BB962C8B-B14F-4D97-AF65-F5344CB8AC3E}">
-        <p14:creationId xmlns:p14="http://schemas.microsoft.com/office/powerpoint/2010/main" val="3438410791"/>
       </p:ext>
     </p:extLst>
   </p:cSld>

</xml_diff>